<commit_message>
modified to include redis and few enhancement
</commit_message>
<xml_diff>
--- a/UPL_TUTORIAL.pptx
+++ b/UPL_TUTORIAL.pptx
@@ -10,15 +10,17 @@
     <p:sldId id="390" r:id="rId4"/>
     <p:sldId id="391" r:id="rId5"/>
     <p:sldId id="392" r:id="rId6"/>
-    <p:sldId id="393" r:id="rId7"/>
-    <p:sldId id="399" r:id="rId8"/>
-    <p:sldId id="394" r:id="rId9"/>
-    <p:sldId id="400" r:id="rId10"/>
-    <p:sldId id="395" r:id="rId11"/>
-    <p:sldId id="396" r:id="rId12"/>
-    <p:sldId id="397" r:id="rId13"/>
-    <p:sldId id="398" r:id="rId14"/>
-    <p:sldId id="379" r:id="rId15"/>
+    <p:sldId id="401" r:id="rId7"/>
+    <p:sldId id="393" r:id="rId8"/>
+    <p:sldId id="399" r:id="rId9"/>
+    <p:sldId id="394" r:id="rId10"/>
+    <p:sldId id="400" r:id="rId11"/>
+    <p:sldId id="402" r:id="rId12"/>
+    <p:sldId id="395" r:id="rId13"/>
+    <p:sldId id="396" r:id="rId14"/>
+    <p:sldId id="397" r:id="rId15"/>
+    <p:sldId id="398" r:id="rId16"/>
+    <p:sldId id="379" r:id="rId17"/>
   </p:sldIdLst>
   <p:sldSz cx="12192000" cy="6858000"/>
   <p:notesSz cx="6858000" cy="9144000"/>
@@ -274,7 +276,7 @@
           <a:p>
             <a:fld id="{32AD6B31-71B2-4178-AC7E-A76CB429D216}" type="datetimeFigureOut">
               <a:rPr lang="en-IN" smtClean="0"/>
-              <a:t>23-05-2025</a:t>
+              <a:t>28-05-2025</a:t>
             </a:fld>
             <a:endParaRPr lang="en-IN"/>
           </a:p>
@@ -474,7 +476,7 @@
           <a:p>
             <a:fld id="{32AD6B31-71B2-4178-AC7E-A76CB429D216}" type="datetimeFigureOut">
               <a:rPr lang="en-IN" smtClean="0"/>
-              <a:t>23-05-2025</a:t>
+              <a:t>28-05-2025</a:t>
             </a:fld>
             <a:endParaRPr lang="en-IN"/>
           </a:p>
@@ -684,7 +686,7 @@
           <a:p>
             <a:fld id="{32AD6B31-71B2-4178-AC7E-A76CB429D216}" type="datetimeFigureOut">
               <a:rPr lang="en-IN" smtClean="0"/>
-              <a:t>23-05-2025</a:t>
+              <a:t>28-05-2025</a:t>
             </a:fld>
             <a:endParaRPr lang="en-IN"/>
           </a:p>
@@ -884,7 +886,7 @@
           <a:p>
             <a:fld id="{32AD6B31-71B2-4178-AC7E-A76CB429D216}" type="datetimeFigureOut">
               <a:rPr lang="en-IN" smtClean="0"/>
-              <a:t>23-05-2025</a:t>
+              <a:t>28-05-2025</a:t>
             </a:fld>
             <a:endParaRPr lang="en-IN"/>
           </a:p>
@@ -1160,7 +1162,7 @@
           <a:p>
             <a:fld id="{32AD6B31-71B2-4178-AC7E-A76CB429D216}" type="datetimeFigureOut">
               <a:rPr lang="en-IN" smtClean="0"/>
-              <a:t>23-05-2025</a:t>
+              <a:t>28-05-2025</a:t>
             </a:fld>
             <a:endParaRPr lang="en-IN"/>
           </a:p>
@@ -1428,7 +1430,7 @@
           <a:p>
             <a:fld id="{32AD6B31-71B2-4178-AC7E-A76CB429D216}" type="datetimeFigureOut">
               <a:rPr lang="en-IN" smtClean="0"/>
-              <a:t>23-05-2025</a:t>
+              <a:t>28-05-2025</a:t>
             </a:fld>
             <a:endParaRPr lang="en-IN"/>
           </a:p>
@@ -1843,7 +1845,7 @@
           <a:p>
             <a:fld id="{32AD6B31-71B2-4178-AC7E-A76CB429D216}" type="datetimeFigureOut">
               <a:rPr lang="en-IN" smtClean="0"/>
-              <a:t>23-05-2025</a:t>
+              <a:t>28-05-2025</a:t>
             </a:fld>
             <a:endParaRPr lang="en-IN"/>
           </a:p>
@@ -1985,7 +1987,7 @@
           <a:p>
             <a:fld id="{32AD6B31-71B2-4178-AC7E-A76CB429D216}" type="datetimeFigureOut">
               <a:rPr lang="en-IN" smtClean="0"/>
-              <a:t>23-05-2025</a:t>
+              <a:t>28-05-2025</a:t>
             </a:fld>
             <a:endParaRPr lang="en-IN"/>
           </a:p>
@@ -2098,7 +2100,7 @@
           <a:p>
             <a:fld id="{32AD6B31-71B2-4178-AC7E-A76CB429D216}" type="datetimeFigureOut">
               <a:rPr lang="en-IN" smtClean="0"/>
-              <a:t>23-05-2025</a:t>
+              <a:t>28-05-2025</a:t>
             </a:fld>
             <a:endParaRPr lang="en-IN"/>
           </a:p>
@@ -2411,7 +2413,7 @@
           <a:p>
             <a:fld id="{32AD6B31-71B2-4178-AC7E-A76CB429D216}" type="datetimeFigureOut">
               <a:rPr lang="en-IN" smtClean="0"/>
-              <a:t>23-05-2025</a:t>
+              <a:t>28-05-2025</a:t>
             </a:fld>
             <a:endParaRPr lang="en-IN"/>
           </a:p>
@@ -2700,7 +2702,7 @@
           <a:p>
             <a:fld id="{32AD6B31-71B2-4178-AC7E-A76CB429D216}" type="datetimeFigureOut">
               <a:rPr lang="en-IN" smtClean="0"/>
-              <a:t>23-05-2025</a:t>
+              <a:t>28-05-2025</a:t>
             </a:fld>
             <a:endParaRPr lang="en-IN"/>
           </a:p>
@@ -2943,7 +2945,7 @@
           <a:p>
             <a:fld id="{32AD6B31-71B2-4178-AC7E-A76CB429D216}" type="datetimeFigureOut">
               <a:rPr lang="en-IN" smtClean="0"/>
-              <a:t>23-05-2025</a:t>
+              <a:t>28-05-2025</a:t>
             </a:fld>
             <a:endParaRPr lang="en-IN"/>
           </a:p>
@@ -4596,7 +4598,13 @@
     </p:bg>
     <p:spTree>
       <p:nvGrpSpPr>
-        <p:cNvPr id="1" name=""/>
+        <p:cNvPr id="1" name="">
+          <a:extLst>
+            <a:ext uri="{FF2B5EF4-FFF2-40B4-BE49-F238E27FC236}">
+              <a16:creationId xmlns:a16="http://schemas.microsoft.com/office/drawing/2014/main" id="{613F90C1-F80B-471F-3D97-B140942527EE}"/>
+            </a:ext>
+          </a:extLst>
+        </p:cNvPr>
         <p:cNvGrpSpPr/>
         <p:nvPr/>
       </p:nvGrpSpPr>
@@ -4613,7 +4621,7 @@
           <p:cNvPr id="2" name="Rectangle 1">
             <a:extLst>
               <a:ext uri="{FF2B5EF4-FFF2-40B4-BE49-F238E27FC236}">
-                <a16:creationId xmlns:a16="http://schemas.microsoft.com/office/drawing/2014/main" id="{1F43DDCF-0BFD-41D4-9DBD-8B9C1E55BFDA}"/>
+                <a16:creationId xmlns:a16="http://schemas.microsoft.com/office/drawing/2014/main" id="{19DD060E-DDFF-302B-0E2A-5B6AFCC94EDB}"/>
               </a:ext>
             </a:extLst>
           </p:cNvPr>
@@ -4662,7 +4670,7 @@
           <p:cNvPr id="3" name="Rectangle 2">
             <a:extLst>
               <a:ext uri="{FF2B5EF4-FFF2-40B4-BE49-F238E27FC236}">
-                <a16:creationId xmlns:a16="http://schemas.microsoft.com/office/drawing/2014/main" id="{C69E7A1B-3BE4-4747-AE20-CCC0585DE900}"/>
+                <a16:creationId xmlns:a16="http://schemas.microsoft.com/office/drawing/2014/main" id="{6F13D513-6975-75D6-84E7-7BCA819821D1}"/>
               </a:ext>
             </a:extLst>
           </p:cNvPr>
@@ -4715,7 +4723,7 @@
           <p:cNvPr id="4" name="Picture 3">
             <a:extLst>
               <a:ext uri="{FF2B5EF4-FFF2-40B4-BE49-F238E27FC236}">
-                <a16:creationId xmlns:a16="http://schemas.microsoft.com/office/drawing/2014/main" id="{C1E9C57F-3FDD-4966-98F1-8E0D200E515D}"/>
+                <a16:creationId xmlns:a16="http://schemas.microsoft.com/office/drawing/2014/main" id="{645555AA-7665-8041-B493-8BD27C8DB6D2}"/>
               </a:ext>
             </a:extLst>
           </p:cNvPr>
@@ -4751,7 +4759,7 @@
           <p:cNvPr id="5" name="Isosceles Triangle 4">
             <a:extLst>
               <a:ext uri="{FF2B5EF4-FFF2-40B4-BE49-F238E27FC236}">
-                <a16:creationId xmlns:a16="http://schemas.microsoft.com/office/drawing/2014/main" id="{C02F2E4F-8386-465C-BFEE-F3568D485DED}"/>
+                <a16:creationId xmlns:a16="http://schemas.microsoft.com/office/drawing/2014/main" id="{6A311DDC-0577-A79B-FA67-35ECF46CEDE5}"/>
               </a:ext>
             </a:extLst>
           </p:cNvPr>
@@ -4800,7 +4808,7 @@
           <p:cNvPr id="6" name="Rectangle 5">
             <a:extLst>
               <a:ext uri="{FF2B5EF4-FFF2-40B4-BE49-F238E27FC236}">
-                <a16:creationId xmlns:a16="http://schemas.microsoft.com/office/drawing/2014/main" id="{DD0590AC-8945-40BD-AF39-74AAC2BE6E76}"/>
+                <a16:creationId xmlns:a16="http://schemas.microsoft.com/office/drawing/2014/main" id="{B87B1F75-0489-E5FB-2EA5-9674711512FF}"/>
               </a:ext>
             </a:extLst>
           </p:cNvPr>
@@ -4849,7 +4857,7 @@
           <p:cNvPr id="8" name="Rectangle 7">
             <a:extLst>
               <a:ext uri="{FF2B5EF4-FFF2-40B4-BE49-F238E27FC236}">
-                <a16:creationId xmlns:a16="http://schemas.microsoft.com/office/drawing/2014/main" id="{66DEBBD4-A188-47F3-AF82-4B76FC934F2A}"/>
+                <a16:creationId xmlns:a16="http://schemas.microsoft.com/office/drawing/2014/main" id="{9AF4A4A9-290A-8A78-9835-C0134F1B9FA8}"/>
               </a:ext>
             </a:extLst>
           </p:cNvPr>
@@ -4885,7 +4893,7 @@
           <p:cNvPr id="10" name="TextBox 9">
             <a:extLst>
               <a:ext uri="{FF2B5EF4-FFF2-40B4-BE49-F238E27FC236}">
-                <a16:creationId xmlns:a16="http://schemas.microsoft.com/office/drawing/2014/main" id="{51649659-6A0F-0DE4-09F4-1153E73F569E}"/>
+                <a16:creationId xmlns:a16="http://schemas.microsoft.com/office/drawing/2014/main" id="{B9FB9FAD-B7F4-112F-DD3F-193367E2BF56}"/>
               </a:ext>
             </a:extLst>
           </p:cNvPr>
@@ -4895,7 +4903,7 @@
         <p:spPr>
           <a:xfrm>
             <a:off x="686857" y="1013243"/>
-            <a:ext cx="10712408" cy="5693866"/>
+            <a:ext cx="10633183" cy="4753609"/>
           </a:xfrm>
           <a:prstGeom prst="rect">
             <a:avLst/>
@@ -4908,135 +4916,143 @@
           </a:bodyPr>
           <a:lstStyle/>
           <a:p>
-            <a:r>
-              <a:rPr lang="en-US" sz="2000" b="1" dirty="0"/>
-              <a:t>Challenges and Solutions</a:t>
-            </a:r>
-          </a:p>
-          <a:p>
-            <a:endParaRPr lang="en-US" sz="2000" b="1" dirty="0"/>
-          </a:p>
-          <a:p>
-            <a:r>
-              <a:rPr lang="en-GB" b="1" dirty="0"/>
-              <a:t>Challenge 1: Role-Based Access Control</a:t>
-            </a:r>
-          </a:p>
-          <a:p>
-            <a:r>
-              <a:rPr lang="en-GB" dirty="0"/>
-              <a:t>Description: Ensuring different functionalities and UI access for guests, instructors, and admins without compromising security.</a:t>
-            </a:r>
-          </a:p>
-          <a:p>
-            <a:r>
-              <a:rPr lang="en-GB" dirty="0"/>
-              <a:t>Solution: Implemented Spring Security with JWT-based authentication and @PreAuthorize annotations to control API access based on roles.</a:t>
-            </a:r>
-          </a:p>
-          <a:p>
-            <a:endParaRPr lang="en-GB" dirty="0"/>
-          </a:p>
-          <a:p>
             <a:pPr>
-              <a:buNone/>
+              <a:lnSpc>
+                <a:spcPct val="150000"/>
+              </a:lnSpc>
             </a:pPr>
             <a:r>
-              <a:rPr lang="en-GB" b="1" dirty="0"/>
-              <a:t>Challenge 2: Instructor Approval Workflow</a:t>
+              <a:rPr lang="en-IN" sz="2400" b="1" dirty="0"/>
+              <a:t>Technology Stack:</a:t>
+            </a:r>
+            <a:r>
+              <a:rPr lang="en-US" sz="2000" dirty="0"/>
+              <a:t>	</a:t>
             </a:r>
           </a:p>
           <a:p>
             <a:pPr>
+              <a:lnSpc>
+                <a:spcPct val="150000"/>
+              </a:lnSpc>
               <a:buFont typeface="Arial" panose="020B0604020202020204" pitchFamily="34" charset="0"/>
               <a:buChar char="•"/>
             </a:pPr>
             <a:r>
-              <a:rPr lang="en-GB" dirty="0"/>
-              <a:t>Description:</a:t>
-            </a:r>
-            <a:br>
-              <a:rPr lang="en-GB" dirty="0"/>
-            </a:br>
-            <a:r>
-              <a:rPr lang="en-GB" dirty="0"/>
-              <a:t>Required a smooth flow for instructor registration, admin approval, and dynamic status updates.</a:t>
+              <a:rPr lang="en-US" sz="2000" dirty="0"/>
+              <a:t>Frontend	Angular 19</a:t>
             </a:r>
           </a:p>
           <a:p>
             <a:pPr>
+              <a:lnSpc>
+                <a:spcPct val="150000"/>
+              </a:lnSpc>
               <a:buFont typeface="Arial" panose="020B0604020202020204" pitchFamily="34" charset="0"/>
               <a:buChar char="•"/>
             </a:pPr>
             <a:r>
-              <a:rPr lang="en-GB" dirty="0"/>
-              <a:t>Solution:</a:t>
-            </a:r>
-            <a:br>
-              <a:rPr lang="en-GB" dirty="0"/>
-            </a:br>
-            <a:r>
-              <a:rPr lang="en-GB" dirty="0"/>
-              <a:t>Created an approval log system with status tracking and admin action APIs for approval or rejection with remarks.</a:t>
-            </a:r>
-          </a:p>
-          <a:p>
-            <a:endParaRPr lang="en-US" dirty="0"/>
+              <a:rPr lang="en-US" sz="2000" dirty="0"/>
+              <a:t>Backend	Spring Boot (Java 21)</a:t>
+            </a:r>
           </a:p>
           <a:p>
             <a:pPr>
-              <a:buNone/>
-            </a:pPr>
-            <a:r>
-              <a:rPr lang="en-GB" b="1" dirty="0"/>
-              <a:t>Challenge 3: Frontend and Backend Integration</a:t>
-            </a:r>
-          </a:p>
-          <a:p>
-            <a:pPr>
+              <a:lnSpc>
+                <a:spcPct val="150000"/>
+              </a:lnSpc>
               <a:buFont typeface="Arial" panose="020B0604020202020204" pitchFamily="34" charset="0"/>
               <a:buChar char="•"/>
             </a:pPr>
             <a:r>
-              <a:rPr lang="en-GB" dirty="0"/>
-              <a:t>Description:</a:t>
-            </a:r>
-            <a:br>
-              <a:rPr lang="en-GB" dirty="0"/>
-            </a:br>
-            <a:r>
-              <a:rPr lang="en-GB" dirty="0"/>
-              <a:t>Syncing Angular components with backend APIs, especially for dynamic data like tutorials and course history.</a:t>
+              <a:rPr lang="en-US" sz="2000" dirty="0"/>
+              <a:t>Database	MySQL</a:t>
             </a:r>
           </a:p>
           <a:p>
             <a:pPr>
+              <a:lnSpc>
+                <a:spcPct val="150000"/>
+              </a:lnSpc>
               <a:buFont typeface="Arial" panose="020B0604020202020204" pitchFamily="34" charset="0"/>
               <a:buChar char="•"/>
             </a:pPr>
             <a:r>
-              <a:rPr lang="en-GB" dirty="0"/>
-              <a:t>Solution:</a:t>
-            </a:r>
-            <a:br>
-              <a:rPr lang="en-GB" dirty="0"/>
-            </a:br>
-            <a:r>
-              <a:rPr lang="en-GB" dirty="0"/>
-              <a:t>Designed standardized REST APIs and used Angular services to handle asynchronous calls with error handling and loading </a:t>
-            </a:r>
-            <a:r>
-              <a:rPr lang="en-GB"/>
-              <a:t>states.</a:t>
-            </a:r>
-            <a:endParaRPr lang="en-GB" dirty="0"/>
+              <a:rPr lang="en-US" sz="2000" dirty="0"/>
+              <a:t>Security	Spring Security, JWT</a:t>
+            </a:r>
+          </a:p>
+          <a:p>
+            <a:pPr>
+              <a:lnSpc>
+                <a:spcPct val="150000"/>
+              </a:lnSpc>
+              <a:buFont typeface="Arial" panose="020B0604020202020204" pitchFamily="34" charset="0"/>
+              <a:buChar char="•"/>
+            </a:pPr>
+            <a:r>
+              <a:rPr lang="en-US" sz="2000" dirty="0"/>
+              <a:t>Monitoring	Spring Boot Actuator, Prometheus, Grafana</a:t>
+            </a:r>
+          </a:p>
+          <a:p>
+            <a:pPr>
+              <a:lnSpc>
+                <a:spcPct val="150000"/>
+              </a:lnSpc>
+              <a:buFont typeface="Arial" panose="020B0604020202020204" pitchFamily="34" charset="0"/>
+              <a:buChar char="•"/>
+            </a:pPr>
+            <a:r>
+              <a:rPr lang="en-US" sz="2000" dirty="0"/>
+              <a:t>Dev Tools	Postman, Visual Studio Code, STS, Maven</a:t>
+            </a:r>
+          </a:p>
+          <a:p>
+            <a:pPr>
+              <a:lnSpc>
+                <a:spcPct val="150000"/>
+              </a:lnSpc>
+              <a:buFont typeface="Arial" panose="020B0604020202020204" pitchFamily="34" charset="0"/>
+              <a:buChar char="•"/>
+            </a:pPr>
+            <a:r>
+              <a:rPr lang="en-US" sz="2000" dirty="0"/>
+              <a:t>Others	                YouTube Embedding, Role-based Access Control</a:t>
+            </a:r>
+          </a:p>
+          <a:p>
+            <a:pPr>
+              <a:lnSpc>
+                <a:spcPct val="150000"/>
+              </a:lnSpc>
+              <a:buFont typeface="Arial" panose="020B0604020202020204" pitchFamily="34" charset="0"/>
+              <a:buChar char="•"/>
+            </a:pPr>
+            <a:r>
+              <a:rPr lang="en-US" sz="2000" dirty="0"/>
+              <a:t>Cache                   Redis </a:t>
+            </a:r>
+          </a:p>
+          <a:p>
+            <a:pPr>
+              <a:lnSpc>
+                <a:spcPct val="150000"/>
+              </a:lnSpc>
+              <a:buFont typeface="Arial" panose="020B0604020202020204" pitchFamily="34" charset="0"/>
+              <a:buChar char="•"/>
+            </a:pPr>
+            <a:r>
+              <a:rPr lang="en-US" sz="2000" dirty="0"/>
+              <a:t>Deployment       Docker, Docker Compose </a:t>
+            </a:r>
           </a:p>
         </p:txBody>
       </p:sp>
     </p:spTree>
     <p:extLst>
       <p:ext uri="{BB962C8B-B14F-4D97-AF65-F5344CB8AC3E}">
-        <p14:creationId xmlns:p14="http://schemas.microsoft.com/office/powerpoint/2010/main" val="1753637166"/>
+        <p14:creationId xmlns:p14="http://schemas.microsoft.com/office/powerpoint/2010/main" val="2074195798"/>
       </p:ext>
     </p:extLst>
   </p:cSld>
@@ -5059,7 +5075,13 @@
     </p:bg>
     <p:spTree>
       <p:nvGrpSpPr>
-        <p:cNvPr id="1" name=""/>
+        <p:cNvPr id="1" name="">
+          <a:extLst>
+            <a:ext uri="{FF2B5EF4-FFF2-40B4-BE49-F238E27FC236}">
+              <a16:creationId xmlns:a16="http://schemas.microsoft.com/office/drawing/2014/main" id="{6B8FA998-8EAD-3F38-E59E-9A9D2958864F}"/>
+            </a:ext>
+          </a:extLst>
+        </p:cNvPr>
         <p:cNvGrpSpPr/>
         <p:nvPr/>
       </p:nvGrpSpPr>
@@ -5076,7 +5098,7 @@
           <p:cNvPr id="2" name="Rectangle 1">
             <a:extLst>
               <a:ext uri="{FF2B5EF4-FFF2-40B4-BE49-F238E27FC236}">
-                <a16:creationId xmlns:a16="http://schemas.microsoft.com/office/drawing/2014/main" id="{1F43DDCF-0BFD-41D4-9DBD-8B9C1E55BFDA}"/>
+                <a16:creationId xmlns:a16="http://schemas.microsoft.com/office/drawing/2014/main" id="{E3D374DD-186C-322A-9B44-FCC59AD33085}"/>
               </a:ext>
             </a:extLst>
           </p:cNvPr>
@@ -5125,7 +5147,7 @@
           <p:cNvPr id="3" name="Rectangle 2">
             <a:extLst>
               <a:ext uri="{FF2B5EF4-FFF2-40B4-BE49-F238E27FC236}">
-                <a16:creationId xmlns:a16="http://schemas.microsoft.com/office/drawing/2014/main" id="{C69E7A1B-3BE4-4747-AE20-CCC0585DE900}"/>
+                <a16:creationId xmlns:a16="http://schemas.microsoft.com/office/drawing/2014/main" id="{EDE0AAC6-296F-F100-16F4-857E64E80962}"/>
               </a:ext>
             </a:extLst>
           </p:cNvPr>
@@ -5178,7 +5200,7 @@
           <p:cNvPr id="4" name="Picture 3">
             <a:extLst>
               <a:ext uri="{FF2B5EF4-FFF2-40B4-BE49-F238E27FC236}">
-                <a16:creationId xmlns:a16="http://schemas.microsoft.com/office/drawing/2014/main" id="{C1E9C57F-3FDD-4966-98F1-8E0D200E515D}"/>
+                <a16:creationId xmlns:a16="http://schemas.microsoft.com/office/drawing/2014/main" id="{099058D0-D8E4-BF84-1A80-D08FFA84CBFD}"/>
               </a:ext>
             </a:extLst>
           </p:cNvPr>
@@ -5214,7 +5236,7 @@
           <p:cNvPr id="5" name="Isosceles Triangle 4">
             <a:extLst>
               <a:ext uri="{FF2B5EF4-FFF2-40B4-BE49-F238E27FC236}">
-                <a16:creationId xmlns:a16="http://schemas.microsoft.com/office/drawing/2014/main" id="{C02F2E4F-8386-465C-BFEE-F3568D485DED}"/>
+                <a16:creationId xmlns:a16="http://schemas.microsoft.com/office/drawing/2014/main" id="{B8A83FF0-E7C6-EE50-9068-AF53CA00C4BD}"/>
               </a:ext>
             </a:extLst>
           </p:cNvPr>
@@ -5263,7 +5285,7 @@
           <p:cNvPr id="6" name="Rectangle 5">
             <a:extLst>
               <a:ext uri="{FF2B5EF4-FFF2-40B4-BE49-F238E27FC236}">
-                <a16:creationId xmlns:a16="http://schemas.microsoft.com/office/drawing/2014/main" id="{DD0590AC-8945-40BD-AF39-74AAC2BE6E76}"/>
+                <a16:creationId xmlns:a16="http://schemas.microsoft.com/office/drawing/2014/main" id="{BEE04CEE-3FA5-5E8B-BEA4-1AF657CCB673}"/>
               </a:ext>
             </a:extLst>
           </p:cNvPr>
@@ -5312,7 +5334,7 @@
           <p:cNvPr id="8" name="Rectangle 7">
             <a:extLst>
               <a:ext uri="{FF2B5EF4-FFF2-40B4-BE49-F238E27FC236}">
-                <a16:creationId xmlns:a16="http://schemas.microsoft.com/office/drawing/2014/main" id="{66DEBBD4-A188-47F3-AF82-4B76FC934F2A}"/>
+                <a16:creationId xmlns:a16="http://schemas.microsoft.com/office/drawing/2014/main" id="{7E6DDFFD-D73C-3334-81FC-1FE86D85A4AB}"/>
               </a:ext>
             </a:extLst>
           </p:cNvPr>
@@ -5348,7 +5370,7 @@
           <p:cNvPr id="10" name="TextBox 9">
             <a:extLst>
               <a:ext uri="{FF2B5EF4-FFF2-40B4-BE49-F238E27FC236}">
-                <a16:creationId xmlns:a16="http://schemas.microsoft.com/office/drawing/2014/main" id="{51649659-6A0F-0DE4-09F4-1153E73F569E}"/>
+                <a16:creationId xmlns:a16="http://schemas.microsoft.com/office/drawing/2014/main" id="{2CA3DADC-B7D0-3E63-5778-FAD7BB7E1C79}"/>
               </a:ext>
             </a:extLst>
           </p:cNvPr>
@@ -5357,8 +5379,8 @@
         </p:nvSpPr>
         <p:spPr>
           <a:xfrm>
-            <a:off x="934348" y="1259260"/>
-            <a:ext cx="10793053" cy="5324535"/>
+            <a:off x="686857" y="1039877"/>
+            <a:ext cx="10633183" cy="5693866"/>
           </a:xfrm>
           <a:prstGeom prst="rect">
             <a:avLst/>
@@ -5372,100 +5394,105 @@
           <a:lstStyle/>
           <a:p>
             <a:r>
-              <a:rPr lang="en-US" sz="2000" b="1" dirty="0"/>
-              <a:t>Future Work</a:t>
-            </a:r>
-          </a:p>
-          <a:p>
-            <a:endParaRPr lang="en-US" sz="2000" b="1" dirty="0"/>
-          </a:p>
-          <a:p>
-            <a:pPr>
-              <a:buNone/>
-            </a:pPr>
-            <a:r>
-              <a:rPr lang="en-GB" sz="2000" b="1" dirty="0"/>
-              <a:t>Enhancements</a:t>
-            </a:r>
-          </a:p>
-          <a:p>
-            <a:pPr marL="342900" indent="-342900">
-              <a:buFont typeface="Arial" panose="020B0604020202020204" pitchFamily="34" charset="0"/>
-              <a:buChar char="•"/>
-            </a:pPr>
-            <a:r>
-              <a:rPr lang="en-GB" sz="2000" dirty="0"/>
-              <a:t>Course Rating and Comments:</a:t>
-            </a:r>
-            <a:br>
-              <a:rPr lang="en-GB" sz="2000" dirty="0"/>
-            </a:br>
-            <a:r>
-              <a:rPr lang="en-GB" sz="2000" dirty="0"/>
-              <a:t>Implement a star-based rating system and threaded comments for better learner feedback and interaction.</a:t>
-            </a:r>
-          </a:p>
-          <a:p>
-            <a:pPr marL="342900" indent="-342900">
-              <a:buFont typeface="Arial" panose="020B0604020202020204" pitchFamily="34" charset="0"/>
-              <a:buChar char="•"/>
-            </a:pPr>
-            <a:r>
-              <a:rPr lang="en-GB" sz="2000" dirty="0"/>
-              <a:t>Redis Caching:</a:t>
-            </a:r>
-            <a:br>
-              <a:rPr lang="en-GB" sz="2000" dirty="0"/>
-            </a:br>
-            <a:r>
-              <a:rPr lang="en-GB" sz="2000" dirty="0"/>
-              <a:t>Integrate Redis to cache frequently accessed data like course/tutorial lists to improve performance and reduce DB load.</a:t>
-            </a:r>
-          </a:p>
-          <a:p>
-            <a:pPr marL="342900" indent="-342900">
-              <a:buFont typeface="Arial" panose="020B0604020202020204" pitchFamily="34" charset="0"/>
-              <a:buChar char="•"/>
-            </a:pPr>
-            <a:r>
-              <a:rPr lang="en-GB" sz="2000" dirty="0"/>
-              <a:t>Audit Logs and Notifications:</a:t>
-            </a:r>
-            <a:br>
-              <a:rPr lang="en-GB" sz="2000" dirty="0"/>
-            </a:br>
-            <a:r>
-              <a:rPr lang="en-GB" sz="2000" dirty="0"/>
-              <a:t>Add audit trails for sensitive operations and real-time notifications for instructor approvals and content updates.</a:t>
-            </a:r>
-          </a:p>
-          <a:p>
-            <a:endParaRPr lang="en-GB" sz="2000" dirty="0"/>
-          </a:p>
-          <a:p>
-            <a:r>
-              <a:rPr lang="en-US" sz="2000" b="1" dirty="0"/>
-              <a:t>Next Steps:</a:t>
-            </a:r>
-          </a:p>
-          <a:p>
-            <a:pPr marL="342900" indent="-342900">
-              <a:buFont typeface="Arial" panose="020B0604020202020204" pitchFamily="34" charset="0"/>
-              <a:buChar char="•"/>
-            </a:pPr>
+              <a:rPr lang="en-IN" sz="2400" b="1" dirty="0"/>
+              <a:t>Admin Dashboard &amp; Monitoring</a:t>
+            </a:r>
+            <a:r>
+              <a:rPr lang="en-IN" sz="2400" dirty="0"/>
+              <a:t> :</a:t>
+            </a:r>
+          </a:p>
+          <a:p>
             <a:r>
               <a:rPr lang="en-US" sz="2000" dirty="0"/>
-              <a:t>CI/CD Pipeline:  Set up a Jenkins pipeline for automated builds, testing, and deployment.</a:t>
-            </a:r>
-          </a:p>
-          <a:p>
-            <a:pPr marL="342900" indent="-342900">
-              <a:buFont typeface="Arial" panose="020B0604020202020204" pitchFamily="34" charset="0"/>
-              <a:buChar char="•"/>
-            </a:pPr>
+              <a:t>- Admin Dashboard</a:t>
+            </a:r>
+          </a:p>
+          <a:p>
             <a:r>
               <a:rPr lang="en-US" sz="2000" dirty="0"/>
-              <a:t>Enhanced Analytics: Expand Grafana dashboards to include usage trends, instructor activity, and course engagement metrics.</a:t>
+              <a:t>  • Review instructor applications</a:t>
+            </a:r>
+          </a:p>
+          <a:p>
+            <a:r>
+              <a:rPr lang="en-US" sz="2000" dirty="0"/>
+              <a:t>  • Approve/reject courses &amp; tutorials</a:t>
+            </a:r>
+          </a:p>
+          <a:p>
+            <a:r>
+              <a:rPr lang="en-US" sz="2000" dirty="0"/>
+              <a:t>  • View activity logs and audit trails</a:t>
+            </a:r>
+          </a:p>
+          <a:p>
+            <a:endParaRPr lang="en-US" sz="2000" dirty="0"/>
+          </a:p>
+          <a:p>
+            <a:r>
+              <a:rPr lang="en-US" sz="2000" dirty="0"/>
+              <a:t>- Grafana Analytics</a:t>
+            </a:r>
+          </a:p>
+          <a:p>
+            <a:r>
+              <a:rPr lang="en-US" sz="2000" dirty="0"/>
+              <a:t>  • Course views and search trends</a:t>
+            </a:r>
+          </a:p>
+          <a:p>
+            <a:r>
+              <a:rPr lang="en-US" sz="2000" dirty="0"/>
+              <a:t>  • Instructor content activity</a:t>
+            </a:r>
+          </a:p>
+          <a:p>
+            <a:r>
+              <a:rPr lang="en-US" sz="2000" dirty="0"/>
+              <a:t>  • System performance (CPU, memory, response times)</a:t>
+            </a:r>
+          </a:p>
+          <a:p>
+            <a:endParaRPr lang="en-US" sz="2000" dirty="0"/>
+          </a:p>
+          <a:p>
+            <a:r>
+              <a:rPr lang="en-US" sz="2000" dirty="0"/>
+              <a:t>- Actuator Endpoints</a:t>
+            </a:r>
+          </a:p>
+          <a:p>
+            <a:r>
+              <a:rPr lang="en-US" sz="2000" dirty="0"/>
+              <a:t>  • Health checks</a:t>
+            </a:r>
+          </a:p>
+          <a:p>
+            <a:r>
+              <a:rPr lang="en-US" sz="2000" dirty="0"/>
+              <a:t>  • Metrics exposed for Prometheus</a:t>
+            </a:r>
+          </a:p>
+          <a:p>
+            <a:endParaRPr lang="en-US" sz="2000" dirty="0"/>
+          </a:p>
+          <a:p>
+            <a:r>
+              <a:rPr lang="en-US" sz="2000" dirty="0"/>
+              <a:t>- Monitoring Stack</a:t>
+            </a:r>
+          </a:p>
+          <a:p>
+            <a:r>
+              <a:rPr lang="en-US" sz="2000" dirty="0"/>
+              <a:t>  • Prometheus: Metrics collection</a:t>
+            </a:r>
+          </a:p>
+          <a:p>
+            <a:r>
+              <a:rPr lang="en-US" sz="2000" dirty="0"/>
+              <a:t>  • Grafana: Real-time dashboard visualization	</a:t>
             </a:r>
           </a:p>
         </p:txBody>
@@ -5473,7 +5500,7 @@
     </p:spTree>
     <p:extLst>
       <p:ext uri="{BB962C8B-B14F-4D97-AF65-F5344CB8AC3E}">
-        <p14:creationId xmlns:p14="http://schemas.microsoft.com/office/powerpoint/2010/main" val="2665658664"/>
+        <p14:creationId xmlns:p14="http://schemas.microsoft.com/office/powerpoint/2010/main" val="3456756644"/>
       </p:ext>
     </p:extLst>
   </p:cSld>
@@ -5795,7 +5822,7 @@
         <p:spPr>
           <a:xfrm>
             <a:off x="686857" y="1013243"/>
-            <a:ext cx="11013912" cy="4401205"/>
+            <a:ext cx="10712408" cy="5693866"/>
           </a:xfrm>
           <a:prstGeom prst="rect">
             <a:avLst/>
@@ -5810,7 +5837,7 @@
           <a:p>
             <a:r>
               <a:rPr lang="en-US" sz="2000" b="1" dirty="0"/>
-              <a:t> Conclusion</a:t>
+              <a:t>Challenges and Solutions</a:t>
             </a:r>
           </a:p>
           <a:p>
@@ -5818,96 +5845,125 @@
           </a:p>
           <a:p>
             <a:r>
-              <a:rPr lang="en-US" sz="2000" b="1" dirty="0"/>
-              <a:t>Summary:</a:t>
-            </a:r>
-          </a:p>
-          <a:p>
-            <a:pPr marL="342900" indent="-342900">
+              <a:rPr lang="en-GB" b="1" dirty="0"/>
+              <a:t>Challenge 1: Role-Based Access Control</a:t>
+            </a:r>
+          </a:p>
+          <a:p>
+            <a:r>
+              <a:rPr lang="en-GB" dirty="0"/>
+              <a:t>Description: Ensuring different functionalities and UI access for guests, instructors, and admins without compromising security.</a:t>
+            </a:r>
+          </a:p>
+          <a:p>
+            <a:r>
+              <a:rPr lang="en-GB" dirty="0"/>
+              <a:t>Solution: Implemented Spring Security with JWT-based authentication and @PreAuthorize annotations to control API access based on roles.</a:t>
+            </a:r>
+          </a:p>
+          <a:p>
+            <a:endParaRPr lang="en-GB" dirty="0"/>
+          </a:p>
+          <a:p>
+            <a:pPr>
+              <a:buNone/>
+            </a:pPr>
+            <a:r>
+              <a:rPr lang="en-GB" b="1" dirty="0"/>
+              <a:t>Challenge 2: Instructor Approval Workflow</a:t>
+            </a:r>
+          </a:p>
+          <a:p>
+            <a:pPr>
               <a:buFont typeface="Arial" panose="020B0604020202020204" pitchFamily="34" charset="0"/>
               <a:buChar char="•"/>
             </a:pPr>
             <a:r>
-              <a:rPr lang="en-US" sz="2000" dirty="0"/>
-              <a:t>UPL Tutorial is a text-based online learning platform aimed at simplifying access to educational content.</a:t>
-            </a:r>
-          </a:p>
-          <a:p>
-            <a:pPr marL="342900" indent="-342900">
+              <a:rPr lang="en-GB" dirty="0"/>
+              <a:t>Description:</a:t>
+            </a:r>
+            <a:br>
+              <a:rPr lang="en-GB" dirty="0"/>
+            </a:br>
+            <a:r>
+              <a:rPr lang="en-GB" dirty="0"/>
+              <a:t>Required a smooth flow for instructor registration, admin approval, and dynamic status updates.</a:t>
+            </a:r>
+          </a:p>
+          <a:p>
+            <a:pPr>
               <a:buFont typeface="Arial" panose="020B0604020202020204" pitchFamily="34" charset="0"/>
               <a:buChar char="•"/>
             </a:pPr>
             <a:r>
-              <a:rPr lang="en-US" sz="2000" dirty="0"/>
-              <a:t>It supports role-based access: general users, instructors, and admins.</a:t>
-            </a:r>
-          </a:p>
-          <a:p>
-            <a:pPr marL="342900" indent="-342900">
+              <a:rPr lang="en-GB" dirty="0"/>
+              <a:t>Solution:</a:t>
+            </a:r>
+            <a:br>
+              <a:rPr lang="en-GB" dirty="0"/>
+            </a:br>
+            <a:r>
+              <a:rPr lang="en-GB" dirty="0"/>
+              <a:t>Created an approval log system with status tracking and admin action APIs for approval or rejection with remarks.</a:t>
+            </a:r>
+          </a:p>
+          <a:p>
+            <a:endParaRPr lang="en-US" dirty="0"/>
+          </a:p>
+          <a:p>
+            <a:pPr>
+              <a:buNone/>
+            </a:pPr>
+            <a:r>
+              <a:rPr lang="en-GB" b="1" dirty="0"/>
+              <a:t>Challenge 3: Frontend and Backend Integration</a:t>
+            </a:r>
+          </a:p>
+          <a:p>
+            <a:pPr>
               <a:buFont typeface="Arial" panose="020B0604020202020204" pitchFamily="34" charset="0"/>
               <a:buChar char="•"/>
             </a:pPr>
             <a:r>
-              <a:rPr lang="en-US" sz="2000" dirty="0"/>
-              <a:t>Key modules include course/tutorial management, instructor approval, and analytics.</a:t>
-            </a:r>
-          </a:p>
-          <a:p>
-            <a:pPr marL="342900" indent="-342900">
+              <a:rPr lang="en-GB" dirty="0"/>
+              <a:t>Description:</a:t>
+            </a:r>
+            <a:br>
+              <a:rPr lang="en-GB" dirty="0"/>
+            </a:br>
+            <a:r>
+              <a:rPr lang="en-GB" dirty="0"/>
+              <a:t>Syncing Angular components with backend APIs, especially for dynamic data like tutorials and course history.</a:t>
+            </a:r>
+          </a:p>
+          <a:p>
+            <a:pPr>
               <a:buFont typeface="Arial" panose="020B0604020202020204" pitchFamily="34" charset="0"/>
               <a:buChar char="•"/>
             </a:pPr>
             <a:r>
-              <a:rPr lang="en-US" sz="2000" dirty="0"/>
-              <a:t>Technologies used: Angular, Spring Boot, MySQL, Prometheus, Grafana.</a:t>
-            </a:r>
-          </a:p>
-          <a:p>
-            <a:endParaRPr lang="en-US" sz="2000" dirty="0"/>
-          </a:p>
-          <a:p>
-            <a:r>
-              <a:rPr lang="en-US" sz="2000" b="1" dirty="0"/>
-              <a:t>Impact:</a:t>
-            </a:r>
-          </a:p>
-          <a:p>
-            <a:pPr marL="342900" indent="-342900">
-              <a:buFont typeface="Arial" panose="020B0604020202020204" pitchFamily="34" charset="0"/>
-              <a:buChar char="•"/>
-            </a:pPr>
-            <a:r>
-              <a:rPr lang="en-GB" sz="2000" dirty="0"/>
-              <a:t>Empowers Learners: Freely accessible tutorials and video content promote self-learning.</a:t>
-            </a:r>
-          </a:p>
-          <a:p>
-            <a:pPr marL="342900" indent="-342900">
-              <a:buFont typeface="Arial" panose="020B0604020202020204" pitchFamily="34" charset="0"/>
-              <a:buChar char="•"/>
-            </a:pPr>
-            <a:r>
-              <a:rPr lang="en-GB" sz="2000" dirty="0"/>
-              <a:t>Enables Contributors: Instructors can create and manage educational material after admin approval.</a:t>
-            </a:r>
-          </a:p>
-          <a:p>
-            <a:pPr marL="342900" indent="-342900">
-              <a:buFont typeface="Arial" panose="020B0604020202020204" pitchFamily="34" charset="0"/>
-              <a:buChar char="•"/>
-            </a:pPr>
-            <a:r>
-              <a:rPr lang="en-GB" sz="2000" dirty="0"/>
-              <a:t>Improves Transparency and Performance: Admin dashboards and monitoring tools support efficient platform management.</a:t>
-            </a:r>
-            <a:endParaRPr lang="en-US" dirty="0"/>
+              <a:rPr lang="en-GB" dirty="0"/>
+              <a:t>Solution:</a:t>
+            </a:r>
+            <a:br>
+              <a:rPr lang="en-GB" dirty="0"/>
+            </a:br>
+            <a:r>
+              <a:rPr lang="en-GB" dirty="0"/>
+              <a:t>Designed standardized REST APIs and used Angular services to handle asynchronous calls with error handling and loading </a:t>
+            </a:r>
+            <a:r>
+              <a:rPr lang="en-GB"/>
+              <a:t>states.</a:t>
+            </a:r>
+            <a:endParaRPr lang="en-GB" dirty="0"/>
           </a:p>
         </p:txBody>
       </p:sp>
     </p:spTree>
     <p:extLst>
       <p:ext uri="{BB962C8B-B14F-4D97-AF65-F5344CB8AC3E}">
-        <p14:creationId xmlns:p14="http://schemas.microsoft.com/office/powerpoint/2010/main" val="3953460157"/>
+        <p14:creationId xmlns:p14="http://schemas.microsoft.com/office/powerpoint/2010/main" val="1753637166"/>
       </p:ext>
     </p:extLst>
   </p:cSld>
@@ -6228,6 +6284,878 @@
         </p:nvSpPr>
         <p:spPr>
           <a:xfrm>
+            <a:off x="934348" y="1259260"/>
+            <a:ext cx="10793053" cy="4708981"/>
+          </a:xfrm>
+          <a:prstGeom prst="rect">
+            <a:avLst/>
+          </a:prstGeom>
+          <a:noFill/>
+        </p:spPr>
+        <p:txBody>
+          <a:bodyPr wrap="square">
+            <a:spAutoFit/>
+          </a:bodyPr>
+          <a:lstStyle/>
+          <a:p>
+            <a:r>
+              <a:rPr lang="en-US" sz="2000" b="1" dirty="0"/>
+              <a:t>Future Work</a:t>
+            </a:r>
+          </a:p>
+          <a:p>
+            <a:endParaRPr lang="en-US" sz="2000" b="1" dirty="0"/>
+          </a:p>
+          <a:p>
+            <a:pPr>
+              <a:buNone/>
+            </a:pPr>
+            <a:r>
+              <a:rPr lang="en-GB" sz="2000" b="1" dirty="0"/>
+              <a:t>Enhancements</a:t>
+            </a:r>
+          </a:p>
+          <a:p>
+            <a:pPr marL="342900" indent="-342900">
+              <a:buFont typeface="Arial" panose="020B0604020202020204" pitchFamily="34" charset="0"/>
+              <a:buChar char="•"/>
+            </a:pPr>
+            <a:r>
+              <a:rPr lang="en-GB" sz="2000" dirty="0"/>
+              <a:t>Course Rating and Comments:</a:t>
+            </a:r>
+            <a:br>
+              <a:rPr lang="en-GB" sz="2000" dirty="0"/>
+            </a:br>
+            <a:r>
+              <a:rPr lang="en-GB" sz="2000" dirty="0"/>
+              <a:t>Implement a star-based rating system and threaded comments for better learner feedback and interaction.</a:t>
+            </a:r>
+          </a:p>
+          <a:p>
+            <a:pPr marL="342900" indent="-342900">
+              <a:buFont typeface="Arial" panose="020B0604020202020204" pitchFamily="34" charset="0"/>
+              <a:buChar char="•"/>
+            </a:pPr>
+            <a:r>
+              <a:rPr lang="en-GB" sz="2000" dirty="0"/>
+              <a:t>JWT Invalidation: Store and expire JWT token </a:t>
+            </a:r>
+            <a:r>
+              <a:rPr lang="en-GB" sz="2000" dirty="0" err="1"/>
+              <a:t>jti</a:t>
+            </a:r>
+            <a:r>
+              <a:rPr lang="en-GB" sz="2000" dirty="0"/>
+              <a:t> in Redis to handle logout and token expiry.</a:t>
+            </a:r>
+          </a:p>
+          <a:p>
+            <a:pPr marL="342900" indent="-342900">
+              <a:buFont typeface="Arial" panose="020B0604020202020204" pitchFamily="34" charset="0"/>
+              <a:buChar char="•"/>
+            </a:pPr>
+            <a:r>
+              <a:rPr lang="en-GB" sz="2000" dirty="0"/>
+              <a:t>Audit Logs and Notifications:</a:t>
+            </a:r>
+            <a:br>
+              <a:rPr lang="en-GB" sz="2000" dirty="0"/>
+            </a:br>
+            <a:r>
+              <a:rPr lang="en-GB" sz="2000" dirty="0"/>
+              <a:t>Add audit trails for sensitive operations and real-time notifications for instructor approvals and content updates.</a:t>
+            </a:r>
+          </a:p>
+          <a:p>
+            <a:endParaRPr lang="en-GB" sz="2000" dirty="0"/>
+          </a:p>
+          <a:p>
+            <a:r>
+              <a:rPr lang="en-US" sz="2000" b="1" dirty="0"/>
+              <a:t>Next Steps:</a:t>
+            </a:r>
+          </a:p>
+          <a:p>
+            <a:pPr marL="342900" indent="-342900">
+              <a:buFont typeface="Arial" panose="020B0604020202020204" pitchFamily="34" charset="0"/>
+              <a:buChar char="•"/>
+            </a:pPr>
+            <a:r>
+              <a:rPr lang="en-US" sz="2000" dirty="0"/>
+              <a:t>CI/CD Pipeline:  Set up a Jenkins pipeline for automated builds, testing, and deployment.</a:t>
+            </a:r>
+          </a:p>
+          <a:p>
+            <a:pPr marL="342900" indent="-342900">
+              <a:buFont typeface="Arial" panose="020B0604020202020204" pitchFamily="34" charset="0"/>
+              <a:buChar char="•"/>
+            </a:pPr>
+            <a:r>
+              <a:rPr lang="en-US" sz="2000" dirty="0"/>
+              <a:t>Enhanced Analytics: Expand Grafana dashboards to include usage trends, instructor activity, and course engagement metrics.</a:t>
+            </a:r>
+          </a:p>
+        </p:txBody>
+      </p:sp>
+    </p:spTree>
+    <p:extLst>
+      <p:ext uri="{BB962C8B-B14F-4D97-AF65-F5344CB8AC3E}">
+        <p14:creationId xmlns:p14="http://schemas.microsoft.com/office/powerpoint/2010/main" val="2665658664"/>
+      </p:ext>
+    </p:extLst>
+  </p:cSld>
+  <p:clrMapOvr>
+    <a:masterClrMapping/>
+  </p:clrMapOvr>
+</p:sld>
+</file>
+
+<file path=ppt/slides/slide14.xml><?xml version="1.0" encoding="utf-8"?>
+<p:sld xmlns:a="http://schemas.openxmlformats.org/drawingml/2006/main" xmlns:r="http://schemas.openxmlformats.org/officeDocument/2006/relationships" xmlns:p="http://schemas.openxmlformats.org/presentationml/2006/main">
+  <p:cSld>
+    <p:bg>
+      <p:bgPr>
+        <a:solidFill>
+          <a:schemeClr val="bg1"/>
+        </a:solidFill>
+        <a:effectLst/>
+      </p:bgPr>
+    </p:bg>
+    <p:spTree>
+      <p:nvGrpSpPr>
+        <p:cNvPr id="1" name=""/>
+        <p:cNvGrpSpPr/>
+        <p:nvPr/>
+      </p:nvGrpSpPr>
+      <p:grpSpPr>
+        <a:xfrm>
+          <a:off x="0" y="0"/>
+          <a:ext cx="0" cy="0"/>
+          <a:chOff x="0" y="0"/>
+          <a:chExt cx="0" cy="0"/>
+        </a:xfrm>
+      </p:grpSpPr>
+      <p:sp>
+        <p:nvSpPr>
+          <p:cNvPr id="2" name="Rectangle 1">
+            <a:extLst>
+              <a:ext uri="{FF2B5EF4-FFF2-40B4-BE49-F238E27FC236}">
+                <a16:creationId xmlns:a16="http://schemas.microsoft.com/office/drawing/2014/main" id="{1F43DDCF-0BFD-41D4-9DBD-8B9C1E55BFDA}"/>
+              </a:ext>
+            </a:extLst>
+          </p:cNvPr>
+          <p:cNvSpPr/>
+          <p:nvPr/>
+        </p:nvSpPr>
+        <p:spPr>
+          <a:xfrm>
+            <a:off x="0" y="0"/>
+            <a:ext cx="389107" cy="6858000"/>
+          </a:xfrm>
+          <a:prstGeom prst="rect">
+            <a:avLst/>
+          </a:prstGeom>
+          <a:solidFill>
+            <a:srgbClr val="0D0DD1"/>
+          </a:solidFill>
+        </p:spPr>
+        <p:style>
+          <a:lnRef idx="2">
+            <a:schemeClr val="accent1">
+              <a:shade val="50000"/>
+            </a:schemeClr>
+          </a:lnRef>
+          <a:fillRef idx="1">
+            <a:schemeClr val="accent1"/>
+          </a:fillRef>
+          <a:effectRef idx="0">
+            <a:schemeClr val="accent1"/>
+          </a:effectRef>
+          <a:fontRef idx="minor">
+            <a:schemeClr val="lt1"/>
+          </a:fontRef>
+        </p:style>
+        <p:txBody>
+          <a:bodyPr rtlCol="0" anchor="ctr"/>
+          <a:lstStyle/>
+          <a:p>
+            <a:pPr algn="ctr"/>
+            <a:endParaRPr lang="en-IN" dirty="0"/>
+          </a:p>
+        </p:txBody>
+      </p:sp>
+      <p:sp>
+        <p:nvSpPr>
+          <p:cNvPr id="3" name="Rectangle 2">
+            <a:extLst>
+              <a:ext uri="{FF2B5EF4-FFF2-40B4-BE49-F238E27FC236}">
+                <a16:creationId xmlns:a16="http://schemas.microsoft.com/office/drawing/2014/main" id="{C69E7A1B-3BE4-4747-AE20-CCC0585DE900}"/>
+              </a:ext>
+            </a:extLst>
+          </p:cNvPr>
+          <p:cNvSpPr/>
+          <p:nvPr/>
+        </p:nvSpPr>
+        <p:spPr>
+          <a:xfrm flipV="1">
+            <a:off x="389107" y="665018"/>
+            <a:ext cx="11802893" cy="85751"/>
+          </a:xfrm>
+          <a:prstGeom prst="rect">
+            <a:avLst/>
+          </a:prstGeom>
+          <a:solidFill>
+            <a:schemeClr val="accent6"/>
+          </a:solidFill>
+        </p:spPr>
+        <p:style>
+          <a:lnRef idx="2">
+            <a:schemeClr val="accent1">
+              <a:shade val="50000"/>
+            </a:schemeClr>
+          </a:lnRef>
+          <a:fillRef idx="1">
+            <a:schemeClr val="accent1"/>
+          </a:fillRef>
+          <a:effectRef idx="0">
+            <a:schemeClr val="accent1"/>
+          </a:effectRef>
+          <a:fontRef idx="minor">
+            <a:schemeClr val="lt1"/>
+          </a:fontRef>
+        </p:style>
+        <p:txBody>
+          <a:bodyPr rtlCol="0" anchor="ctr"/>
+          <a:lstStyle/>
+          <a:p>
+            <a:pPr algn="ctr"/>
+            <a:endParaRPr lang="en-IN" dirty="0">
+              <a:solidFill>
+                <a:schemeClr val="accent1"/>
+              </a:solidFill>
+            </a:endParaRPr>
+          </a:p>
+        </p:txBody>
+      </p:sp>
+      <p:pic>
+        <p:nvPicPr>
+          <p:cNvPr id="4" name="Picture 3">
+            <a:extLst>
+              <a:ext uri="{FF2B5EF4-FFF2-40B4-BE49-F238E27FC236}">
+                <a16:creationId xmlns:a16="http://schemas.microsoft.com/office/drawing/2014/main" id="{C1E9C57F-3FDD-4966-98F1-8E0D200E515D}"/>
+              </a:ext>
+            </a:extLst>
+          </p:cNvPr>
+          <p:cNvPicPr>
+            <a:picLocks noChangeAspect="1"/>
+          </p:cNvPicPr>
+          <p:nvPr/>
+        </p:nvPicPr>
+        <p:blipFill>
+          <a:blip r:embed="rId2">
+            <a:extLst>
+              <a:ext uri="{28A0092B-C50C-407E-A947-70E740481C1C}">
+                <a14:useLocalDpi xmlns:a14="http://schemas.microsoft.com/office/drawing/2010/main" val="0"/>
+              </a:ext>
+            </a:extLst>
+          </a:blip>
+          <a:stretch>
+            <a:fillRect/>
+          </a:stretch>
+        </p:blipFill>
+        <p:spPr>
+          <a:xfrm>
+            <a:off x="10247206" y="-150696"/>
+            <a:ext cx="1152059" cy="1152059"/>
+          </a:xfrm>
+          <a:prstGeom prst="rect">
+            <a:avLst/>
+          </a:prstGeom>
+        </p:spPr>
+      </p:pic>
+      <p:sp>
+        <p:nvSpPr>
+          <p:cNvPr id="5" name="Isosceles Triangle 4">
+            <a:extLst>
+              <a:ext uri="{FF2B5EF4-FFF2-40B4-BE49-F238E27FC236}">
+                <a16:creationId xmlns:a16="http://schemas.microsoft.com/office/drawing/2014/main" id="{C02F2E4F-8386-465C-BFEE-F3568D485DED}"/>
+              </a:ext>
+            </a:extLst>
+          </p:cNvPr>
+          <p:cNvSpPr/>
+          <p:nvPr/>
+        </p:nvSpPr>
+        <p:spPr>
+          <a:xfrm rot="8083567">
+            <a:off x="11350884" y="6345334"/>
+            <a:ext cx="1232054" cy="600610"/>
+          </a:xfrm>
+          <a:prstGeom prst="triangle">
+            <a:avLst/>
+          </a:prstGeom>
+          <a:solidFill>
+            <a:srgbClr val="5046D6"/>
+          </a:solidFill>
+        </p:spPr>
+        <p:style>
+          <a:lnRef idx="2">
+            <a:schemeClr val="accent1">
+              <a:shade val="50000"/>
+            </a:schemeClr>
+          </a:lnRef>
+          <a:fillRef idx="1">
+            <a:schemeClr val="accent1"/>
+          </a:fillRef>
+          <a:effectRef idx="0">
+            <a:schemeClr val="accent1"/>
+          </a:effectRef>
+          <a:fontRef idx="minor">
+            <a:schemeClr val="lt1"/>
+          </a:fontRef>
+        </p:style>
+        <p:txBody>
+          <a:bodyPr rtlCol="0" anchor="ctr"/>
+          <a:lstStyle/>
+          <a:p>
+            <a:pPr algn="ctr"/>
+            <a:endParaRPr lang="en-IN"/>
+          </a:p>
+        </p:txBody>
+      </p:sp>
+      <p:sp>
+        <p:nvSpPr>
+          <p:cNvPr id="6" name="Rectangle 5">
+            <a:extLst>
+              <a:ext uri="{FF2B5EF4-FFF2-40B4-BE49-F238E27FC236}">
+                <a16:creationId xmlns:a16="http://schemas.microsoft.com/office/drawing/2014/main" id="{DD0590AC-8945-40BD-AF39-74AAC2BE6E76}"/>
+              </a:ext>
+            </a:extLst>
+          </p:cNvPr>
+          <p:cNvSpPr/>
+          <p:nvPr/>
+        </p:nvSpPr>
+        <p:spPr>
+          <a:xfrm>
+            <a:off x="389107" y="147843"/>
+            <a:ext cx="1608133" cy="369332"/>
+          </a:xfrm>
+          <a:prstGeom prst="rect">
+            <a:avLst/>
+          </a:prstGeom>
+        </p:spPr>
+        <p:txBody>
+          <a:bodyPr wrap="none">
+            <a:spAutoFit/>
+          </a:bodyPr>
+          <a:lstStyle/>
+          <a:p>
+            <a:r>
+              <a:rPr lang="en-US" dirty="0">
+                <a:solidFill>
+                  <a:srgbClr val="0070C0"/>
+                </a:solidFill>
+                <a:latin typeface="Arial Black"/>
+                <a:ea typeface="+mn-lt"/>
+                <a:cs typeface="+mn-lt"/>
+              </a:rPr>
+              <a:t>CONTENTS</a:t>
+            </a:r>
+            <a:endParaRPr lang="en-IN" dirty="0">
+              <a:solidFill>
+                <a:srgbClr val="0070C0"/>
+              </a:solidFill>
+              <a:latin typeface="Arial Black"/>
+              <a:ea typeface="+mn-lt"/>
+              <a:cs typeface="+mn-lt"/>
+            </a:endParaRPr>
+          </a:p>
+        </p:txBody>
+      </p:sp>
+      <p:sp>
+        <p:nvSpPr>
+          <p:cNvPr id="8" name="Rectangle 7">
+            <a:extLst>
+              <a:ext uri="{FF2B5EF4-FFF2-40B4-BE49-F238E27FC236}">
+                <a16:creationId xmlns:a16="http://schemas.microsoft.com/office/drawing/2014/main" id="{66DEBBD4-A188-47F3-AF82-4B76FC934F2A}"/>
+              </a:ext>
+            </a:extLst>
+          </p:cNvPr>
+          <p:cNvSpPr/>
+          <p:nvPr/>
+        </p:nvSpPr>
+        <p:spPr>
+          <a:xfrm>
+            <a:off x="6751985" y="147843"/>
+            <a:ext cx="3774175" cy="369332"/>
+          </a:xfrm>
+          <a:prstGeom prst="rect">
+            <a:avLst/>
+          </a:prstGeom>
+        </p:spPr>
+        <p:txBody>
+          <a:bodyPr wrap="none">
+            <a:spAutoFit/>
+          </a:bodyPr>
+          <a:lstStyle/>
+          <a:p>
+            <a:r>
+              <a:rPr lang="en-IN" dirty="0">
+                <a:latin typeface="Arial Black" panose="020B0A04020102020204" pitchFamily="34" charset="0"/>
+              </a:rPr>
+              <a:t>Unlimited Powerful Learning</a:t>
+            </a:r>
+          </a:p>
+        </p:txBody>
+      </p:sp>
+      <p:sp>
+        <p:nvSpPr>
+          <p:cNvPr id="10" name="TextBox 9">
+            <a:extLst>
+              <a:ext uri="{FF2B5EF4-FFF2-40B4-BE49-F238E27FC236}">
+                <a16:creationId xmlns:a16="http://schemas.microsoft.com/office/drawing/2014/main" id="{51649659-6A0F-0DE4-09F4-1153E73F569E}"/>
+              </a:ext>
+            </a:extLst>
+          </p:cNvPr>
+          <p:cNvSpPr txBox="1"/>
+          <p:nvPr/>
+        </p:nvSpPr>
+        <p:spPr>
+          <a:xfrm>
+            <a:off x="686857" y="1013243"/>
+            <a:ext cx="11013912" cy="4401205"/>
+          </a:xfrm>
+          <a:prstGeom prst="rect">
+            <a:avLst/>
+          </a:prstGeom>
+          <a:noFill/>
+        </p:spPr>
+        <p:txBody>
+          <a:bodyPr wrap="square">
+            <a:spAutoFit/>
+          </a:bodyPr>
+          <a:lstStyle/>
+          <a:p>
+            <a:r>
+              <a:rPr lang="en-US" sz="2000" b="1" dirty="0"/>
+              <a:t> Conclusion</a:t>
+            </a:r>
+          </a:p>
+          <a:p>
+            <a:endParaRPr lang="en-US" sz="2000" b="1" dirty="0"/>
+          </a:p>
+          <a:p>
+            <a:r>
+              <a:rPr lang="en-US" sz="2000" b="1" dirty="0"/>
+              <a:t>Summary:</a:t>
+            </a:r>
+          </a:p>
+          <a:p>
+            <a:pPr marL="342900" indent="-342900">
+              <a:buFont typeface="Arial" panose="020B0604020202020204" pitchFamily="34" charset="0"/>
+              <a:buChar char="•"/>
+            </a:pPr>
+            <a:r>
+              <a:rPr lang="en-US" sz="2000" dirty="0"/>
+              <a:t>UPL Tutorial is a text-based online learning platform aimed at simplifying access to educational content.</a:t>
+            </a:r>
+          </a:p>
+          <a:p>
+            <a:pPr marL="342900" indent="-342900">
+              <a:buFont typeface="Arial" panose="020B0604020202020204" pitchFamily="34" charset="0"/>
+              <a:buChar char="•"/>
+            </a:pPr>
+            <a:r>
+              <a:rPr lang="en-US" sz="2000" dirty="0"/>
+              <a:t>It supports role-based access: general users, instructors, and admins.</a:t>
+            </a:r>
+          </a:p>
+          <a:p>
+            <a:pPr marL="342900" indent="-342900">
+              <a:buFont typeface="Arial" panose="020B0604020202020204" pitchFamily="34" charset="0"/>
+              <a:buChar char="•"/>
+            </a:pPr>
+            <a:r>
+              <a:rPr lang="en-US" sz="2000" dirty="0"/>
+              <a:t>Key modules include course/tutorial management, instructor approval, and analytics.</a:t>
+            </a:r>
+          </a:p>
+          <a:p>
+            <a:pPr marL="342900" indent="-342900">
+              <a:buFont typeface="Arial" panose="020B0604020202020204" pitchFamily="34" charset="0"/>
+              <a:buChar char="•"/>
+            </a:pPr>
+            <a:r>
+              <a:rPr lang="en-US" sz="2000" dirty="0"/>
+              <a:t>Technologies used: Angular, Spring Boot, MySQL, Prometheus, Grafana.</a:t>
+            </a:r>
+          </a:p>
+          <a:p>
+            <a:endParaRPr lang="en-US" sz="2000" dirty="0"/>
+          </a:p>
+          <a:p>
+            <a:r>
+              <a:rPr lang="en-US" sz="2000" b="1" dirty="0"/>
+              <a:t>Impact:</a:t>
+            </a:r>
+          </a:p>
+          <a:p>
+            <a:pPr marL="342900" indent="-342900">
+              <a:buFont typeface="Arial" panose="020B0604020202020204" pitchFamily="34" charset="0"/>
+              <a:buChar char="•"/>
+            </a:pPr>
+            <a:r>
+              <a:rPr lang="en-GB" sz="2000" dirty="0"/>
+              <a:t>Empowers Learners: Freely accessible tutorials and video content promote self-learning.</a:t>
+            </a:r>
+          </a:p>
+          <a:p>
+            <a:pPr marL="342900" indent="-342900">
+              <a:buFont typeface="Arial" panose="020B0604020202020204" pitchFamily="34" charset="0"/>
+              <a:buChar char="•"/>
+            </a:pPr>
+            <a:r>
+              <a:rPr lang="en-GB" sz="2000" dirty="0"/>
+              <a:t>Enables Contributors: Instructors can create and manage educational material after admin approval.</a:t>
+            </a:r>
+          </a:p>
+          <a:p>
+            <a:pPr marL="342900" indent="-342900">
+              <a:buFont typeface="Arial" panose="020B0604020202020204" pitchFamily="34" charset="0"/>
+              <a:buChar char="•"/>
+            </a:pPr>
+            <a:r>
+              <a:rPr lang="en-GB" sz="2000" dirty="0"/>
+              <a:t>Improves Transparency and Performance: Admin dashboards and monitoring tools support efficient platform management.</a:t>
+            </a:r>
+            <a:endParaRPr lang="en-US" dirty="0"/>
+          </a:p>
+        </p:txBody>
+      </p:sp>
+    </p:spTree>
+    <p:extLst>
+      <p:ext uri="{BB962C8B-B14F-4D97-AF65-F5344CB8AC3E}">
+        <p14:creationId xmlns:p14="http://schemas.microsoft.com/office/powerpoint/2010/main" val="3953460157"/>
+      </p:ext>
+    </p:extLst>
+  </p:cSld>
+  <p:clrMapOvr>
+    <a:masterClrMapping/>
+  </p:clrMapOvr>
+</p:sld>
+</file>
+
+<file path=ppt/slides/slide15.xml><?xml version="1.0" encoding="utf-8"?>
+<p:sld xmlns:a="http://schemas.openxmlformats.org/drawingml/2006/main" xmlns:r="http://schemas.openxmlformats.org/officeDocument/2006/relationships" xmlns:p="http://schemas.openxmlformats.org/presentationml/2006/main">
+  <p:cSld>
+    <p:bg>
+      <p:bgPr>
+        <a:solidFill>
+          <a:schemeClr val="bg1"/>
+        </a:solidFill>
+        <a:effectLst/>
+      </p:bgPr>
+    </p:bg>
+    <p:spTree>
+      <p:nvGrpSpPr>
+        <p:cNvPr id="1" name=""/>
+        <p:cNvGrpSpPr/>
+        <p:nvPr/>
+      </p:nvGrpSpPr>
+      <p:grpSpPr>
+        <a:xfrm>
+          <a:off x="0" y="0"/>
+          <a:ext cx="0" cy="0"/>
+          <a:chOff x="0" y="0"/>
+          <a:chExt cx="0" cy="0"/>
+        </a:xfrm>
+      </p:grpSpPr>
+      <p:sp>
+        <p:nvSpPr>
+          <p:cNvPr id="2" name="Rectangle 1">
+            <a:extLst>
+              <a:ext uri="{FF2B5EF4-FFF2-40B4-BE49-F238E27FC236}">
+                <a16:creationId xmlns:a16="http://schemas.microsoft.com/office/drawing/2014/main" id="{1F43DDCF-0BFD-41D4-9DBD-8B9C1E55BFDA}"/>
+              </a:ext>
+            </a:extLst>
+          </p:cNvPr>
+          <p:cNvSpPr/>
+          <p:nvPr/>
+        </p:nvSpPr>
+        <p:spPr>
+          <a:xfrm>
+            <a:off x="0" y="0"/>
+            <a:ext cx="389107" cy="6858000"/>
+          </a:xfrm>
+          <a:prstGeom prst="rect">
+            <a:avLst/>
+          </a:prstGeom>
+          <a:solidFill>
+            <a:srgbClr val="0D0DD1"/>
+          </a:solidFill>
+        </p:spPr>
+        <p:style>
+          <a:lnRef idx="2">
+            <a:schemeClr val="accent1">
+              <a:shade val="50000"/>
+            </a:schemeClr>
+          </a:lnRef>
+          <a:fillRef idx="1">
+            <a:schemeClr val="accent1"/>
+          </a:fillRef>
+          <a:effectRef idx="0">
+            <a:schemeClr val="accent1"/>
+          </a:effectRef>
+          <a:fontRef idx="minor">
+            <a:schemeClr val="lt1"/>
+          </a:fontRef>
+        </p:style>
+        <p:txBody>
+          <a:bodyPr rtlCol="0" anchor="ctr"/>
+          <a:lstStyle/>
+          <a:p>
+            <a:pPr algn="ctr"/>
+            <a:endParaRPr lang="en-IN" dirty="0"/>
+          </a:p>
+        </p:txBody>
+      </p:sp>
+      <p:sp>
+        <p:nvSpPr>
+          <p:cNvPr id="3" name="Rectangle 2">
+            <a:extLst>
+              <a:ext uri="{FF2B5EF4-FFF2-40B4-BE49-F238E27FC236}">
+                <a16:creationId xmlns:a16="http://schemas.microsoft.com/office/drawing/2014/main" id="{C69E7A1B-3BE4-4747-AE20-CCC0585DE900}"/>
+              </a:ext>
+            </a:extLst>
+          </p:cNvPr>
+          <p:cNvSpPr/>
+          <p:nvPr/>
+        </p:nvSpPr>
+        <p:spPr>
+          <a:xfrm flipV="1">
+            <a:off x="389107" y="665018"/>
+            <a:ext cx="11802893" cy="85751"/>
+          </a:xfrm>
+          <a:prstGeom prst="rect">
+            <a:avLst/>
+          </a:prstGeom>
+          <a:solidFill>
+            <a:schemeClr val="accent6"/>
+          </a:solidFill>
+        </p:spPr>
+        <p:style>
+          <a:lnRef idx="2">
+            <a:schemeClr val="accent1">
+              <a:shade val="50000"/>
+            </a:schemeClr>
+          </a:lnRef>
+          <a:fillRef idx="1">
+            <a:schemeClr val="accent1"/>
+          </a:fillRef>
+          <a:effectRef idx="0">
+            <a:schemeClr val="accent1"/>
+          </a:effectRef>
+          <a:fontRef idx="minor">
+            <a:schemeClr val="lt1"/>
+          </a:fontRef>
+        </p:style>
+        <p:txBody>
+          <a:bodyPr rtlCol="0" anchor="ctr"/>
+          <a:lstStyle/>
+          <a:p>
+            <a:pPr algn="ctr"/>
+            <a:endParaRPr lang="en-IN" dirty="0">
+              <a:solidFill>
+                <a:schemeClr val="accent1"/>
+              </a:solidFill>
+            </a:endParaRPr>
+          </a:p>
+        </p:txBody>
+      </p:sp>
+      <p:pic>
+        <p:nvPicPr>
+          <p:cNvPr id="4" name="Picture 3">
+            <a:extLst>
+              <a:ext uri="{FF2B5EF4-FFF2-40B4-BE49-F238E27FC236}">
+                <a16:creationId xmlns:a16="http://schemas.microsoft.com/office/drawing/2014/main" id="{C1E9C57F-3FDD-4966-98F1-8E0D200E515D}"/>
+              </a:ext>
+            </a:extLst>
+          </p:cNvPr>
+          <p:cNvPicPr>
+            <a:picLocks noChangeAspect="1"/>
+          </p:cNvPicPr>
+          <p:nvPr/>
+        </p:nvPicPr>
+        <p:blipFill>
+          <a:blip r:embed="rId2">
+            <a:extLst>
+              <a:ext uri="{28A0092B-C50C-407E-A947-70E740481C1C}">
+                <a14:useLocalDpi xmlns:a14="http://schemas.microsoft.com/office/drawing/2010/main" val="0"/>
+              </a:ext>
+            </a:extLst>
+          </a:blip>
+          <a:stretch>
+            <a:fillRect/>
+          </a:stretch>
+        </p:blipFill>
+        <p:spPr>
+          <a:xfrm>
+            <a:off x="10247206" y="-150696"/>
+            <a:ext cx="1152059" cy="1152059"/>
+          </a:xfrm>
+          <a:prstGeom prst="rect">
+            <a:avLst/>
+          </a:prstGeom>
+        </p:spPr>
+      </p:pic>
+      <p:sp>
+        <p:nvSpPr>
+          <p:cNvPr id="5" name="Isosceles Triangle 4">
+            <a:extLst>
+              <a:ext uri="{FF2B5EF4-FFF2-40B4-BE49-F238E27FC236}">
+                <a16:creationId xmlns:a16="http://schemas.microsoft.com/office/drawing/2014/main" id="{C02F2E4F-8386-465C-BFEE-F3568D485DED}"/>
+              </a:ext>
+            </a:extLst>
+          </p:cNvPr>
+          <p:cNvSpPr/>
+          <p:nvPr/>
+        </p:nvSpPr>
+        <p:spPr>
+          <a:xfrm rot="8083567">
+            <a:off x="11350884" y="6345334"/>
+            <a:ext cx="1232054" cy="600610"/>
+          </a:xfrm>
+          <a:prstGeom prst="triangle">
+            <a:avLst/>
+          </a:prstGeom>
+          <a:solidFill>
+            <a:srgbClr val="5046D6"/>
+          </a:solidFill>
+        </p:spPr>
+        <p:style>
+          <a:lnRef idx="2">
+            <a:schemeClr val="accent1">
+              <a:shade val="50000"/>
+            </a:schemeClr>
+          </a:lnRef>
+          <a:fillRef idx="1">
+            <a:schemeClr val="accent1"/>
+          </a:fillRef>
+          <a:effectRef idx="0">
+            <a:schemeClr val="accent1"/>
+          </a:effectRef>
+          <a:fontRef idx="minor">
+            <a:schemeClr val="lt1"/>
+          </a:fontRef>
+        </p:style>
+        <p:txBody>
+          <a:bodyPr rtlCol="0" anchor="ctr"/>
+          <a:lstStyle/>
+          <a:p>
+            <a:pPr algn="ctr"/>
+            <a:endParaRPr lang="en-IN"/>
+          </a:p>
+        </p:txBody>
+      </p:sp>
+      <p:sp>
+        <p:nvSpPr>
+          <p:cNvPr id="6" name="Rectangle 5">
+            <a:extLst>
+              <a:ext uri="{FF2B5EF4-FFF2-40B4-BE49-F238E27FC236}">
+                <a16:creationId xmlns:a16="http://schemas.microsoft.com/office/drawing/2014/main" id="{DD0590AC-8945-40BD-AF39-74AAC2BE6E76}"/>
+              </a:ext>
+            </a:extLst>
+          </p:cNvPr>
+          <p:cNvSpPr/>
+          <p:nvPr/>
+        </p:nvSpPr>
+        <p:spPr>
+          <a:xfrm>
+            <a:off x="389107" y="147843"/>
+            <a:ext cx="1608133" cy="369332"/>
+          </a:xfrm>
+          <a:prstGeom prst="rect">
+            <a:avLst/>
+          </a:prstGeom>
+        </p:spPr>
+        <p:txBody>
+          <a:bodyPr wrap="none">
+            <a:spAutoFit/>
+          </a:bodyPr>
+          <a:lstStyle/>
+          <a:p>
+            <a:r>
+              <a:rPr lang="en-US" dirty="0">
+                <a:solidFill>
+                  <a:srgbClr val="0070C0"/>
+                </a:solidFill>
+                <a:latin typeface="Arial Black"/>
+                <a:ea typeface="+mn-lt"/>
+                <a:cs typeface="+mn-lt"/>
+              </a:rPr>
+              <a:t>CONTENTS</a:t>
+            </a:r>
+            <a:endParaRPr lang="en-IN" dirty="0">
+              <a:solidFill>
+                <a:srgbClr val="0070C0"/>
+              </a:solidFill>
+              <a:latin typeface="Arial Black"/>
+              <a:ea typeface="+mn-lt"/>
+              <a:cs typeface="+mn-lt"/>
+            </a:endParaRPr>
+          </a:p>
+        </p:txBody>
+      </p:sp>
+      <p:sp>
+        <p:nvSpPr>
+          <p:cNvPr id="8" name="Rectangle 7">
+            <a:extLst>
+              <a:ext uri="{FF2B5EF4-FFF2-40B4-BE49-F238E27FC236}">
+                <a16:creationId xmlns:a16="http://schemas.microsoft.com/office/drawing/2014/main" id="{66DEBBD4-A188-47F3-AF82-4B76FC934F2A}"/>
+              </a:ext>
+            </a:extLst>
+          </p:cNvPr>
+          <p:cNvSpPr/>
+          <p:nvPr/>
+        </p:nvSpPr>
+        <p:spPr>
+          <a:xfrm>
+            <a:off x="6751985" y="147843"/>
+            <a:ext cx="3774175" cy="369332"/>
+          </a:xfrm>
+          <a:prstGeom prst="rect">
+            <a:avLst/>
+          </a:prstGeom>
+        </p:spPr>
+        <p:txBody>
+          <a:bodyPr wrap="none">
+            <a:spAutoFit/>
+          </a:bodyPr>
+          <a:lstStyle/>
+          <a:p>
+            <a:r>
+              <a:rPr lang="en-IN" dirty="0">
+                <a:latin typeface="Arial Black" panose="020B0A04020102020204" pitchFamily="34" charset="0"/>
+              </a:rPr>
+              <a:t>Unlimited Powerful Learning</a:t>
+            </a:r>
+          </a:p>
+        </p:txBody>
+      </p:sp>
+      <p:sp>
+        <p:nvSpPr>
+          <p:cNvPr id="10" name="TextBox 9">
+            <a:extLst>
+              <a:ext uri="{FF2B5EF4-FFF2-40B4-BE49-F238E27FC236}">
+                <a16:creationId xmlns:a16="http://schemas.microsoft.com/office/drawing/2014/main" id="{51649659-6A0F-0DE4-09F4-1153E73F569E}"/>
+              </a:ext>
+            </a:extLst>
+          </p:cNvPr>
+          <p:cNvSpPr txBox="1"/>
+          <p:nvPr/>
+        </p:nvSpPr>
+        <p:spPr>
+          <a:xfrm>
             <a:off x="1638202" y="1831853"/>
             <a:ext cx="10712408" cy="3477875"/>
           </a:xfrm>
@@ -6330,7 +7258,7 @@
 </p:sld>
 </file>
 
-<file path=ppt/slides/slide14.xml><?xml version="1.0" encoding="utf-8"?>
+<file path=ppt/slides/slide16.xml><?xml version="1.0" encoding="utf-8"?>
 <p:sld xmlns:a="http://schemas.openxmlformats.org/drawingml/2006/main" xmlns:r="http://schemas.openxmlformats.org/officeDocument/2006/relationships" xmlns:p="http://schemas.openxmlformats.org/presentationml/2006/main">
   <p:cSld>
     <p:bg>
@@ -6800,7 +7728,7 @@
         <p:spPr>
           <a:xfrm>
             <a:off x="1341375" y="1708946"/>
-            <a:ext cx="8366763" cy="4199611"/>
+            <a:ext cx="8366763" cy="4661276"/>
           </a:xfrm>
           <a:prstGeom prst="rect">
             <a:avLst/>
@@ -6890,6 +7818,19 @@
             <a:r>
               <a:rPr lang="en-US" sz="2000" b="1" dirty="0"/>
               <a:t>Technical Architecture</a:t>
+            </a:r>
+          </a:p>
+          <a:p>
+            <a:pPr>
+              <a:lnSpc>
+                <a:spcPct val="150000"/>
+              </a:lnSpc>
+              <a:buFont typeface="Arial" panose="020B0604020202020204" pitchFamily="34" charset="0"/>
+              <a:buChar char="•"/>
+            </a:pPr>
+            <a:r>
+              <a:rPr lang="en-US" sz="2000" b="1" dirty="0"/>
+              <a:t>Admin Dashboard and Monitoring</a:t>
             </a:r>
             <a:endParaRPr lang="en-US" sz="2000" dirty="0"/>
           </a:p>
@@ -8210,7 +9151,7 @@
         <p:spPr>
           <a:xfrm>
             <a:off x="686857" y="1013243"/>
-            <a:ext cx="10960198" cy="5909310"/>
+            <a:ext cx="10960198" cy="4801314"/>
           </a:xfrm>
           <a:prstGeom prst="rect">
             <a:avLst/>
@@ -8368,39 +9309,6 @@
             <a:r>
               <a:rPr lang="en-GB" dirty="0"/>
               <a:t>Benefits: Enables complete control over platform activities and user management</a:t>
-            </a:r>
-          </a:p>
-          <a:p>
-            <a:endParaRPr lang="en-GB" dirty="0"/>
-          </a:p>
-          <a:p>
-            <a:pPr>
-              <a:buNone/>
-            </a:pPr>
-            <a:r>
-              <a:rPr lang="en-GB" b="1" dirty="0"/>
-              <a:t>Feature 5: Guest Access</a:t>
-            </a:r>
-            <a:endParaRPr lang="en-GB" dirty="0"/>
-          </a:p>
-          <a:p>
-            <a:pPr>
-              <a:buFont typeface="Arial" panose="020B0604020202020204" pitchFamily="34" charset="0"/>
-              <a:buChar char="•"/>
-            </a:pPr>
-            <a:r>
-              <a:rPr lang="en-GB" dirty="0"/>
-              <a:t>Description: Unregistered users can freely browse available courses and tutorials</a:t>
-            </a:r>
-          </a:p>
-          <a:p>
-            <a:pPr>
-              <a:buFont typeface="Arial" panose="020B0604020202020204" pitchFamily="34" charset="0"/>
-              <a:buChar char="•"/>
-            </a:pPr>
-            <a:r>
-              <a:rPr lang="en-GB" dirty="0"/>
-              <a:t>Benefits: Promotes open access to learning resources</a:t>
             </a:r>
           </a:p>
         </p:txBody>
@@ -8431,7 +9339,13 @@
     </p:bg>
     <p:spTree>
       <p:nvGrpSpPr>
-        <p:cNvPr id="1" name=""/>
+        <p:cNvPr id="1" name="">
+          <a:extLst>
+            <a:ext uri="{FF2B5EF4-FFF2-40B4-BE49-F238E27FC236}">
+              <a16:creationId xmlns:a16="http://schemas.microsoft.com/office/drawing/2014/main" id="{F470DFE6-5E51-890B-CE98-AC82B768B8EA}"/>
+            </a:ext>
+          </a:extLst>
+        </p:cNvPr>
         <p:cNvGrpSpPr/>
         <p:nvPr/>
       </p:nvGrpSpPr>
@@ -8448,7 +9362,7 @@
           <p:cNvPr id="2" name="Rectangle 1">
             <a:extLst>
               <a:ext uri="{FF2B5EF4-FFF2-40B4-BE49-F238E27FC236}">
-                <a16:creationId xmlns:a16="http://schemas.microsoft.com/office/drawing/2014/main" id="{1F43DDCF-0BFD-41D4-9DBD-8B9C1E55BFDA}"/>
+                <a16:creationId xmlns:a16="http://schemas.microsoft.com/office/drawing/2014/main" id="{EA0A3800-E5D7-A7AD-008A-A883D60CF187}"/>
               </a:ext>
             </a:extLst>
           </p:cNvPr>
@@ -8497,7 +9411,7 @@
           <p:cNvPr id="3" name="Rectangle 2">
             <a:extLst>
               <a:ext uri="{FF2B5EF4-FFF2-40B4-BE49-F238E27FC236}">
-                <a16:creationId xmlns:a16="http://schemas.microsoft.com/office/drawing/2014/main" id="{C69E7A1B-3BE4-4747-AE20-CCC0585DE900}"/>
+                <a16:creationId xmlns:a16="http://schemas.microsoft.com/office/drawing/2014/main" id="{8784D5C9-041E-5544-FA13-8F95879914F3}"/>
               </a:ext>
             </a:extLst>
           </p:cNvPr>
@@ -8550,7 +9464,7 @@
           <p:cNvPr id="4" name="Picture 3">
             <a:extLst>
               <a:ext uri="{FF2B5EF4-FFF2-40B4-BE49-F238E27FC236}">
-                <a16:creationId xmlns:a16="http://schemas.microsoft.com/office/drawing/2014/main" id="{C1E9C57F-3FDD-4966-98F1-8E0D200E515D}"/>
+                <a16:creationId xmlns:a16="http://schemas.microsoft.com/office/drawing/2014/main" id="{858F75F6-99BD-B14B-F012-0BA187D5906E}"/>
               </a:ext>
             </a:extLst>
           </p:cNvPr>
@@ -8586,7 +9500,7 @@
           <p:cNvPr id="5" name="Isosceles Triangle 4">
             <a:extLst>
               <a:ext uri="{FF2B5EF4-FFF2-40B4-BE49-F238E27FC236}">
-                <a16:creationId xmlns:a16="http://schemas.microsoft.com/office/drawing/2014/main" id="{C02F2E4F-8386-465C-BFEE-F3568D485DED}"/>
+                <a16:creationId xmlns:a16="http://schemas.microsoft.com/office/drawing/2014/main" id="{96FDAC13-B37B-8832-3ABB-9B6E4555A1CC}"/>
               </a:ext>
             </a:extLst>
           </p:cNvPr>
@@ -8635,6 +9549,494 @@
           <p:cNvPr id="6" name="Rectangle 5">
             <a:extLst>
               <a:ext uri="{FF2B5EF4-FFF2-40B4-BE49-F238E27FC236}">
+                <a16:creationId xmlns:a16="http://schemas.microsoft.com/office/drawing/2014/main" id="{F5D8D730-FFB1-6097-2001-9F06B7A86880}"/>
+              </a:ext>
+            </a:extLst>
+          </p:cNvPr>
+          <p:cNvSpPr/>
+          <p:nvPr/>
+        </p:nvSpPr>
+        <p:spPr>
+          <a:xfrm>
+            <a:off x="389107" y="147843"/>
+            <a:ext cx="1608133" cy="369332"/>
+          </a:xfrm>
+          <a:prstGeom prst="rect">
+            <a:avLst/>
+          </a:prstGeom>
+        </p:spPr>
+        <p:txBody>
+          <a:bodyPr wrap="none">
+            <a:spAutoFit/>
+          </a:bodyPr>
+          <a:lstStyle/>
+          <a:p>
+            <a:r>
+              <a:rPr lang="en-US" dirty="0">
+                <a:solidFill>
+                  <a:srgbClr val="0070C0"/>
+                </a:solidFill>
+                <a:latin typeface="Arial Black"/>
+                <a:ea typeface="+mn-lt"/>
+                <a:cs typeface="+mn-lt"/>
+              </a:rPr>
+              <a:t>CONTENTS</a:t>
+            </a:r>
+            <a:endParaRPr lang="en-IN" dirty="0">
+              <a:solidFill>
+                <a:srgbClr val="0070C0"/>
+              </a:solidFill>
+              <a:latin typeface="Arial Black"/>
+              <a:ea typeface="+mn-lt"/>
+              <a:cs typeface="+mn-lt"/>
+            </a:endParaRPr>
+          </a:p>
+        </p:txBody>
+      </p:sp>
+      <p:sp>
+        <p:nvSpPr>
+          <p:cNvPr id="8" name="Rectangle 7">
+            <a:extLst>
+              <a:ext uri="{FF2B5EF4-FFF2-40B4-BE49-F238E27FC236}">
+                <a16:creationId xmlns:a16="http://schemas.microsoft.com/office/drawing/2014/main" id="{40872BFB-08FA-A284-1E70-879B1F22FF64}"/>
+              </a:ext>
+            </a:extLst>
+          </p:cNvPr>
+          <p:cNvSpPr/>
+          <p:nvPr/>
+        </p:nvSpPr>
+        <p:spPr>
+          <a:xfrm>
+            <a:off x="6751985" y="147843"/>
+            <a:ext cx="3774175" cy="369332"/>
+          </a:xfrm>
+          <a:prstGeom prst="rect">
+            <a:avLst/>
+          </a:prstGeom>
+        </p:spPr>
+        <p:txBody>
+          <a:bodyPr wrap="none">
+            <a:spAutoFit/>
+          </a:bodyPr>
+          <a:lstStyle/>
+          <a:p>
+            <a:r>
+              <a:rPr lang="en-IN" dirty="0">
+                <a:latin typeface="Arial Black" panose="020B0A04020102020204" pitchFamily="34" charset="0"/>
+              </a:rPr>
+              <a:t>Unlimited Powerful Learning</a:t>
+            </a:r>
+          </a:p>
+        </p:txBody>
+      </p:sp>
+      <p:sp>
+        <p:nvSpPr>
+          <p:cNvPr id="10" name="TextBox 9">
+            <a:extLst>
+              <a:ext uri="{FF2B5EF4-FFF2-40B4-BE49-F238E27FC236}">
+                <a16:creationId xmlns:a16="http://schemas.microsoft.com/office/drawing/2014/main" id="{DBDCDA82-4B4F-9DF7-88B3-A12D14D26ED6}"/>
+              </a:ext>
+            </a:extLst>
+          </p:cNvPr>
+          <p:cNvSpPr txBox="1"/>
+          <p:nvPr/>
+        </p:nvSpPr>
+        <p:spPr>
+          <a:xfrm>
+            <a:off x="686857" y="1013243"/>
+            <a:ext cx="10960198" cy="5632311"/>
+          </a:xfrm>
+          <a:prstGeom prst="rect">
+            <a:avLst/>
+          </a:prstGeom>
+          <a:noFill/>
+        </p:spPr>
+        <p:txBody>
+          <a:bodyPr wrap="square">
+            <a:spAutoFit/>
+          </a:bodyPr>
+          <a:lstStyle/>
+          <a:p>
+            <a:pPr>
+              <a:buNone/>
+            </a:pPr>
+            <a:r>
+              <a:rPr lang="en-GB" b="1" dirty="0"/>
+              <a:t>Features and Functionality</a:t>
+            </a:r>
+          </a:p>
+          <a:p>
+            <a:endParaRPr lang="en-GB" dirty="0"/>
+          </a:p>
+          <a:p>
+            <a:pPr>
+              <a:buNone/>
+            </a:pPr>
+            <a:r>
+              <a:rPr lang="en-GB" b="1" dirty="0"/>
+              <a:t>Feature 5: Guest Access</a:t>
+            </a:r>
+            <a:endParaRPr lang="en-GB" dirty="0"/>
+          </a:p>
+          <a:p>
+            <a:pPr>
+              <a:buFont typeface="Arial" panose="020B0604020202020204" pitchFamily="34" charset="0"/>
+              <a:buChar char="•"/>
+            </a:pPr>
+            <a:r>
+              <a:rPr lang="en-GB" dirty="0"/>
+              <a:t>Description: Unregistered users can freely browse available courses and tutorials</a:t>
+            </a:r>
+          </a:p>
+          <a:p>
+            <a:pPr>
+              <a:buFont typeface="Arial" panose="020B0604020202020204" pitchFamily="34" charset="0"/>
+              <a:buChar char="•"/>
+            </a:pPr>
+            <a:r>
+              <a:rPr lang="en-GB" dirty="0"/>
+              <a:t>Benefits: Promotes open access to learning resources</a:t>
+            </a:r>
+          </a:p>
+          <a:p>
+            <a:pPr>
+              <a:buNone/>
+            </a:pPr>
+            <a:endParaRPr lang="en-GB" b="1" dirty="0"/>
+          </a:p>
+          <a:p>
+            <a:pPr>
+              <a:buNone/>
+            </a:pPr>
+            <a:r>
+              <a:rPr lang="en-GB" b="1" dirty="0"/>
+              <a:t>Feature 6: Searching </a:t>
+            </a:r>
+          </a:p>
+          <a:p>
+            <a:pPr>
+              <a:buNone/>
+            </a:pPr>
+            <a:r>
+              <a:rPr lang="en-GB" dirty="0"/>
+              <a:t>Description: Course search functionality for general users using keyword-based queries.</a:t>
+            </a:r>
+          </a:p>
+          <a:p>
+            <a:pPr>
+              <a:buNone/>
+            </a:pPr>
+            <a:r>
+              <a:rPr lang="en-GB" dirty="0"/>
+              <a:t>Benefits: Fast and responsive user experience using Redis for in-memory caching of search results.</a:t>
+            </a:r>
+          </a:p>
+          <a:p>
+            <a:pPr>
+              <a:buNone/>
+            </a:pPr>
+            <a:endParaRPr lang="en-GB" dirty="0"/>
+          </a:p>
+          <a:p>
+            <a:pPr>
+              <a:buNone/>
+            </a:pPr>
+            <a:r>
+              <a:rPr lang="en-GB" b="1" dirty="0"/>
+              <a:t>Feature 7: Deployment</a:t>
+            </a:r>
+            <a:endParaRPr lang="en-GB" dirty="0"/>
+          </a:p>
+          <a:p>
+            <a:pPr>
+              <a:buFont typeface="Arial" panose="020B0604020202020204" pitchFamily="34" charset="0"/>
+              <a:buChar char="•"/>
+            </a:pPr>
+            <a:r>
+              <a:rPr lang="en-GB" dirty="0"/>
+              <a:t>Description: Full-stack application components (Angular, Spring Boot, MySQL, Redis, Grafana, Prometheus) containerized using Docker and orchestrated via Docker Compose.</a:t>
+            </a:r>
+          </a:p>
+          <a:p>
+            <a:pPr>
+              <a:buFont typeface="Arial" panose="020B0604020202020204" pitchFamily="34" charset="0"/>
+              <a:buChar char="•"/>
+            </a:pPr>
+            <a:r>
+              <a:rPr lang="en-GB" dirty="0"/>
+              <a:t>Benefits: Simplified setup and consistent environment across development and deployment stages.</a:t>
+            </a:r>
+          </a:p>
+          <a:p>
+            <a:pPr>
+              <a:buFont typeface="Arial" panose="020B0604020202020204" pitchFamily="34" charset="0"/>
+              <a:buChar char="•"/>
+            </a:pPr>
+            <a:endParaRPr lang="en-GB" dirty="0"/>
+          </a:p>
+          <a:p>
+            <a:pPr>
+              <a:buNone/>
+            </a:pPr>
+            <a:r>
+              <a:rPr lang="en-GB" b="1" dirty="0"/>
+              <a:t>Feature 8: </a:t>
+            </a:r>
+            <a:r>
+              <a:rPr lang="en-IN" b="1" dirty="0"/>
+              <a:t>Performance Monitoring</a:t>
+            </a:r>
+          </a:p>
+          <a:p>
+            <a:pPr>
+              <a:buNone/>
+            </a:pPr>
+            <a:r>
+              <a:rPr lang="en-GB" dirty="0"/>
+              <a:t>Description: Integrated Prometheus with Spring Boot Actuator for metrics collection, visualized through Grafana dashboards.</a:t>
+            </a:r>
+          </a:p>
+          <a:p>
+            <a:pPr>
+              <a:buNone/>
+            </a:pPr>
+            <a:r>
+              <a:rPr lang="en-GB" dirty="0"/>
+              <a:t>Benefits: Real-time monitoring of request metrics, memory/CPU usage, and service health to improve performance and reliability</a:t>
+            </a:r>
+          </a:p>
+        </p:txBody>
+      </p:sp>
+    </p:spTree>
+    <p:extLst>
+      <p:ext uri="{BB962C8B-B14F-4D97-AF65-F5344CB8AC3E}">
+        <p14:creationId xmlns:p14="http://schemas.microsoft.com/office/powerpoint/2010/main" val="4282819422"/>
+      </p:ext>
+    </p:extLst>
+  </p:cSld>
+  <p:clrMapOvr>
+    <a:overrideClrMapping bg1="lt1" tx1="dk1" bg2="lt2" tx2="dk2" accent1="accent1" accent2="accent2" accent3="accent3" accent4="accent4" accent5="accent5" accent6="accent6" hlink="hlink" folHlink="folHlink"/>
+  </p:clrMapOvr>
+</p:sld>
+</file>
+
+<file path=ppt/slides/slide7.xml><?xml version="1.0" encoding="utf-8"?>
+<p:sld xmlns:a="http://schemas.openxmlformats.org/drawingml/2006/main" xmlns:r="http://schemas.openxmlformats.org/officeDocument/2006/relationships" xmlns:p="http://schemas.openxmlformats.org/presentationml/2006/main">
+  <p:cSld>
+    <p:bg>
+      <p:bgPr>
+        <a:solidFill>
+          <a:schemeClr val="bg1"/>
+        </a:solidFill>
+        <a:effectLst/>
+      </p:bgPr>
+    </p:bg>
+    <p:spTree>
+      <p:nvGrpSpPr>
+        <p:cNvPr id="1" name=""/>
+        <p:cNvGrpSpPr/>
+        <p:nvPr/>
+      </p:nvGrpSpPr>
+      <p:grpSpPr>
+        <a:xfrm>
+          <a:off x="0" y="0"/>
+          <a:ext cx="0" cy="0"/>
+          <a:chOff x="0" y="0"/>
+          <a:chExt cx="0" cy="0"/>
+        </a:xfrm>
+      </p:grpSpPr>
+      <p:sp>
+        <p:nvSpPr>
+          <p:cNvPr id="2" name="Rectangle 1">
+            <a:extLst>
+              <a:ext uri="{FF2B5EF4-FFF2-40B4-BE49-F238E27FC236}">
+                <a16:creationId xmlns:a16="http://schemas.microsoft.com/office/drawing/2014/main" id="{1F43DDCF-0BFD-41D4-9DBD-8B9C1E55BFDA}"/>
+              </a:ext>
+            </a:extLst>
+          </p:cNvPr>
+          <p:cNvSpPr/>
+          <p:nvPr/>
+        </p:nvSpPr>
+        <p:spPr>
+          <a:xfrm>
+            <a:off x="0" y="0"/>
+            <a:ext cx="389107" cy="6858000"/>
+          </a:xfrm>
+          <a:prstGeom prst="rect">
+            <a:avLst/>
+          </a:prstGeom>
+          <a:solidFill>
+            <a:srgbClr val="0D0DD1"/>
+          </a:solidFill>
+        </p:spPr>
+        <p:style>
+          <a:lnRef idx="2">
+            <a:schemeClr val="accent1">
+              <a:shade val="50000"/>
+            </a:schemeClr>
+          </a:lnRef>
+          <a:fillRef idx="1">
+            <a:schemeClr val="accent1"/>
+          </a:fillRef>
+          <a:effectRef idx="0">
+            <a:schemeClr val="accent1"/>
+          </a:effectRef>
+          <a:fontRef idx="minor">
+            <a:schemeClr val="lt1"/>
+          </a:fontRef>
+        </p:style>
+        <p:txBody>
+          <a:bodyPr rtlCol="0" anchor="ctr"/>
+          <a:lstStyle/>
+          <a:p>
+            <a:pPr algn="ctr"/>
+            <a:endParaRPr lang="en-IN" dirty="0"/>
+          </a:p>
+        </p:txBody>
+      </p:sp>
+      <p:sp>
+        <p:nvSpPr>
+          <p:cNvPr id="3" name="Rectangle 2">
+            <a:extLst>
+              <a:ext uri="{FF2B5EF4-FFF2-40B4-BE49-F238E27FC236}">
+                <a16:creationId xmlns:a16="http://schemas.microsoft.com/office/drawing/2014/main" id="{C69E7A1B-3BE4-4747-AE20-CCC0585DE900}"/>
+              </a:ext>
+            </a:extLst>
+          </p:cNvPr>
+          <p:cNvSpPr/>
+          <p:nvPr/>
+        </p:nvSpPr>
+        <p:spPr>
+          <a:xfrm flipV="1">
+            <a:off x="389107" y="665018"/>
+            <a:ext cx="11802893" cy="85751"/>
+          </a:xfrm>
+          <a:prstGeom prst="rect">
+            <a:avLst/>
+          </a:prstGeom>
+          <a:solidFill>
+            <a:schemeClr val="accent6"/>
+          </a:solidFill>
+        </p:spPr>
+        <p:style>
+          <a:lnRef idx="2">
+            <a:schemeClr val="accent1">
+              <a:shade val="50000"/>
+            </a:schemeClr>
+          </a:lnRef>
+          <a:fillRef idx="1">
+            <a:schemeClr val="accent1"/>
+          </a:fillRef>
+          <a:effectRef idx="0">
+            <a:schemeClr val="accent1"/>
+          </a:effectRef>
+          <a:fontRef idx="minor">
+            <a:schemeClr val="lt1"/>
+          </a:fontRef>
+        </p:style>
+        <p:txBody>
+          <a:bodyPr rtlCol="0" anchor="ctr"/>
+          <a:lstStyle/>
+          <a:p>
+            <a:pPr algn="ctr"/>
+            <a:endParaRPr lang="en-IN" dirty="0">
+              <a:solidFill>
+                <a:schemeClr val="accent1"/>
+              </a:solidFill>
+            </a:endParaRPr>
+          </a:p>
+        </p:txBody>
+      </p:sp>
+      <p:pic>
+        <p:nvPicPr>
+          <p:cNvPr id="4" name="Picture 3">
+            <a:extLst>
+              <a:ext uri="{FF2B5EF4-FFF2-40B4-BE49-F238E27FC236}">
+                <a16:creationId xmlns:a16="http://schemas.microsoft.com/office/drawing/2014/main" id="{C1E9C57F-3FDD-4966-98F1-8E0D200E515D}"/>
+              </a:ext>
+            </a:extLst>
+          </p:cNvPr>
+          <p:cNvPicPr>
+            <a:picLocks noChangeAspect="1"/>
+          </p:cNvPicPr>
+          <p:nvPr/>
+        </p:nvPicPr>
+        <p:blipFill>
+          <a:blip r:embed="rId3">
+            <a:extLst>
+              <a:ext uri="{28A0092B-C50C-407E-A947-70E740481C1C}">
+                <a14:useLocalDpi xmlns:a14="http://schemas.microsoft.com/office/drawing/2010/main" val="0"/>
+              </a:ext>
+            </a:extLst>
+          </a:blip>
+          <a:stretch>
+            <a:fillRect/>
+          </a:stretch>
+        </p:blipFill>
+        <p:spPr>
+          <a:xfrm>
+            <a:off x="10247206" y="-150696"/>
+            <a:ext cx="1152059" cy="1152059"/>
+          </a:xfrm>
+          <a:prstGeom prst="rect">
+            <a:avLst/>
+          </a:prstGeom>
+        </p:spPr>
+      </p:pic>
+      <p:sp>
+        <p:nvSpPr>
+          <p:cNvPr id="5" name="Isosceles Triangle 4">
+            <a:extLst>
+              <a:ext uri="{FF2B5EF4-FFF2-40B4-BE49-F238E27FC236}">
+                <a16:creationId xmlns:a16="http://schemas.microsoft.com/office/drawing/2014/main" id="{C02F2E4F-8386-465C-BFEE-F3568D485DED}"/>
+              </a:ext>
+            </a:extLst>
+          </p:cNvPr>
+          <p:cNvSpPr/>
+          <p:nvPr/>
+        </p:nvSpPr>
+        <p:spPr>
+          <a:xfrm rot="8083567">
+            <a:off x="11350884" y="6345334"/>
+            <a:ext cx="1232054" cy="600610"/>
+          </a:xfrm>
+          <a:prstGeom prst="triangle">
+            <a:avLst/>
+          </a:prstGeom>
+          <a:solidFill>
+            <a:srgbClr val="5046D6"/>
+          </a:solidFill>
+        </p:spPr>
+        <p:style>
+          <a:lnRef idx="2">
+            <a:schemeClr val="accent1">
+              <a:shade val="50000"/>
+            </a:schemeClr>
+          </a:lnRef>
+          <a:fillRef idx="1">
+            <a:schemeClr val="accent1"/>
+          </a:fillRef>
+          <a:effectRef idx="0">
+            <a:schemeClr val="accent1"/>
+          </a:effectRef>
+          <a:fontRef idx="minor">
+            <a:schemeClr val="lt1"/>
+          </a:fontRef>
+        </p:style>
+        <p:txBody>
+          <a:bodyPr rtlCol="0" anchor="ctr"/>
+          <a:lstStyle/>
+          <a:p>
+            <a:pPr algn="ctr"/>
+            <a:endParaRPr lang="en-IN"/>
+          </a:p>
+        </p:txBody>
+      </p:sp>
+      <p:sp>
+        <p:nvSpPr>
+          <p:cNvPr id="6" name="Rectangle 5">
+            <a:extLst>
+              <a:ext uri="{FF2B5EF4-FFF2-40B4-BE49-F238E27FC236}">
                 <a16:creationId xmlns:a16="http://schemas.microsoft.com/office/drawing/2014/main" id="{DD0590AC-8945-40BD-AF39-74AAC2BE6E76}"/>
               </a:ext>
             </a:extLst>
@@ -8861,7 +10263,7 @@
 </p:sld>
 </file>
 
-<file path=ppt/slides/slide7.xml><?xml version="1.0" encoding="utf-8"?>
+<file path=ppt/slides/slide8.xml><?xml version="1.0" encoding="utf-8"?>
 <p:sld xmlns:a="http://schemas.openxmlformats.org/drawingml/2006/main" xmlns:r="http://schemas.openxmlformats.org/officeDocument/2006/relationships" xmlns:p="http://schemas.openxmlformats.org/presentationml/2006/main">
   <p:cSld>
     <p:bg>
@@ -9303,7 +10705,7 @@
 </p:sld>
 </file>
 
-<file path=ppt/slides/slide8.xml><?xml version="1.0" encoding="utf-8"?>
+<file path=ppt/slides/slide9.xml><?xml version="1.0" encoding="utf-8"?>
 <p:sld xmlns:a="http://schemas.openxmlformats.org/drawingml/2006/main" xmlns:r="http://schemas.openxmlformats.org/officeDocument/2006/relationships" xmlns:p="http://schemas.openxmlformats.org/presentationml/2006/main">
   <p:cSld>
     <p:bg>
@@ -9736,462 +11138,6 @@
     <p:extLst>
       <p:ext uri="{BB962C8B-B14F-4D97-AF65-F5344CB8AC3E}">
         <p14:creationId xmlns:p14="http://schemas.microsoft.com/office/powerpoint/2010/main" val="1493703788"/>
-      </p:ext>
-    </p:extLst>
-  </p:cSld>
-  <p:clrMapOvr>
-    <a:masterClrMapping/>
-  </p:clrMapOvr>
-</p:sld>
-</file>
-
-<file path=ppt/slides/slide9.xml><?xml version="1.0" encoding="utf-8"?>
-<p:sld xmlns:a="http://schemas.openxmlformats.org/drawingml/2006/main" xmlns:r="http://schemas.openxmlformats.org/officeDocument/2006/relationships" xmlns:p="http://schemas.openxmlformats.org/presentationml/2006/main">
-  <p:cSld>
-    <p:bg>
-      <p:bgPr>
-        <a:solidFill>
-          <a:schemeClr val="bg1"/>
-        </a:solidFill>
-        <a:effectLst/>
-      </p:bgPr>
-    </p:bg>
-    <p:spTree>
-      <p:nvGrpSpPr>
-        <p:cNvPr id="1" name="">
-          <a:extLst>
-            <a:ext uri="{FF2B5EF4-FFF2-40B4-BE49-F238E27FC236}">
-              <a16:creationId xmlns:a16="http://schemas.microsoft.com/office/drawing/2014/main" id="{613F90C1-F80B-471F-3D97-B140942527EE}"/>
-            </a:ext>
-          </a:extLst>
-        </p:cNvPr>
-        <p:cNvGrpSpPr/>
-        <p:nvPr/>
-      </p:nvGrpSpPr>
-      <p:grpSpPr>
-        <a:xfrm>
-          <a:off x="0" y="0"/>
-          <a:ext cx="0" cy="0"/>
-          <a:chOff x="0" y="0"/>
-          <a:chExt cx="0" cy="0"/>
-        </a:xfrm>
-      </p:grpSpPr>
-      <p:sp>
-        <p:nvSpPr>
-          <p:cNvPr id="2" name="Rectangle 1">
-            <a:extLst>
-              <a:ext uri="{FF2B5EF4-FFF2-40B4-BE49-F238E27FC236}">
-                <a16:creationId xmlns:a16="http://schemas.microsoft.com/office/drawing/2014/main" id="{19DD060E-DDFF-302B-0E2A-5B6AFCC94EDB}"/>
-              </a:ext>
-            </a:extLst>
-          </p:cNvPr>
-          <p:cNvSpPr/>
-          <p:nvPr/>
-        </p:nvSpPr>
-        <p:spPr>
-          <a:xfrm>
-            <a:off x="0" y="0"/>
-            <a:ext cx="389107" cy="6858000"/>
-          </a:xfrm>
-          <a:prstGeom prst="rect">
-            <a:avLst/>
-          </a:prstGeom>
-          <a:solidFill>
-            <a:srgbClr val="0D0DD1"/>
-          </a:solidFill>
-        </p:spPr>
-        <p:style>
-          <a:lnRef idx="2">
-            <a:schemeClr val="accent1">
-              <a:shade val="50000"/>
-            </a:schemeClr>
-          </a:lnRef>
-          <a:fillRef idx="1">
-            <a:schemeClr val="accent1"/>
-          </a:fillRef>
-          <a:effectRef idx="0">
-            <a:schemeClr val="accent1"/>
-          </a:effectRef>
-          <a:fontRef idx="minor">
-            <a:schemeClr val="lt1"/>
-          </a:fontRef>
-        </p:style>
-        <p:txBody>
-          <a:bodyPr rtlCol="0" anchor="ctr"/>
-          <a:lstStyle/>
-          <a:p>
-            <a:pPr algn="ctr"/>
-            <a:endParaRPr lang="en-IN" dirty="0"/>
-          </a:p>
-        </p:txBody>
-      </p:sp>
-      <p:sp>
-        <p:nvSpPr>
-          <p:cNvPr id="3" name="Rectangle 2">
-            <a:extLst>
-              <a:ext uri="{FF2B5EF4-FFF2-40B4-BE49-F238E27FC236}">
-                <a16:creationId xmlns:a16="http://schemas.microsoft.com/office/drawing/2014/main" id="{6F13D513-6975-75D6-84E7-7BCA819821D1}"/>
-              </a:ext>
-            </a:extLst>
-          </p:cNvPr>
-          <p:cNvSpPr/>
-          <p:nvPr/>
-        </p:nvSpPr>
-        <p:spPr>
-          <a:xfrm flipV="1">
-            <a:off x="389107" y="665018"/>
-            <a:ext cx="11802893" cy="85751"/>
-          </a:xfrm>
-          <a:prstGeom prst="rect">
-            <a:avLst/>
-          </a:prstGeom>
-          <a:solidFill>
-            <a:schemeClr val="accent6"/>
-          </a:solidFill>
-        </p:spPr>
-        <p:style>
-          <a:lnRef idx="2">
-            <a:schemeClr val="accent1">
-              <a:shade val="50000"/>
-            </a:schemeClr>
-          </a:lnRef>
-          <a:fillRef idx="1">
-            <a:schemeClr val="accent1"/>
-          </a:fillRef>
-          <a:effectRef idx="0">
-            <a:schemeClr val="accent1"/>
-          </a:effectRef>
-          <a:fontRef idx="minor">
-            <a:schemeClr val="lt1"/>
-          </a:fontRef>
-        </p:style>
-        <p:txBody>
-          <a:bodyPr rtlCol="0" anchor="ctr"/>
-          <a:lstStyle/>
-          <a:p>
-            <a:pPr algn="ctr"/>
-            <a:endParaRPr lang="en-IN" dirty="0">
-              <a:solidFill>
-                <a:schemeClr val="accent1"/>
-              </a:solidFill>
-            </a:endParaRPr>
-          </a:p>
-        </p:txBody>
-      </p:sp>
-      <p:pic>
-        <p:nvPicPr>
-          <p:cNvPr id="4" name="Picture 3">
-            <a:extLst>
-              <a:ext uri="{FF2B5EF4-FFF2-40B4-BE49-F238E27FC236}">
-                <a16:creationId xmlns:a16="http://schemas.microsoft.com/office/drawing/2014/main" id="{645555AA-7665-8041-B493-8BD27C8DB6D2}"/>
-              </a:ext>
-            </a:extLst>
-          </p:cNvPr>
-          <p:cNvPicPr>
-            <a:picLocks noChangeAspect="1"/>
-          </p:cNvPicPr>
-          <p:nvPr/>
-        </p:nvPicPr>
-        <p:blipFill>
-          <a:blip r:embed="rId2">
-            <a:extLst>
-              <a:ext uri="{28A0092B-C50C-407E-A947-70E740481C1C}">
-                <a14:useLocalDpi xmlns:a14="http://schemas.microsoft.com/office/drawing/2010/main" val="0"/>
-              </a:ext>
-            </a:extLst>
-          </a:blip>
-          <a:stretch>
-            <a:fillRect/>
-          </a:stretch>
-        </p:blipFill>
-        <p:spPr>
-          <a:xfrm>
-            <a:off x="10247206" y="-150696"/>
-            <a:ext cx="1152059" cy="1152059"/>
-          </a:xfrm>
-          <a:prstGeom prst="rect">
-            <a:avLst/>
-          </a:prstGeom>
-        </p:spPr>
-      </p:pic>
-      <p:sp>
-        <p:nvSpPr>
-          <p:cNvPr id="5" name="Isosceles Triangle 4">
-            <a:extLst>
-              <a:ext uri="{FF2B5EF4-FFF2-40B4-BE49-F238E27FC236}">
-                <a16:creationId xmlns:a16="http://schemas.microsoft.com/office/drawing/2014/main" id="{6A311DDC-0577-A79B-FA67-35ECF46CEDE5}"/>
-              </a:ext>
-            </a:extLst>
-          </p:cNvPr>
-          <p:cNvSpPr/>
-          <p:nvPr/>
-        </p:nvSpPr>
-        <p:spPr>
-          <a:xfrm rot="8083567">
-            <a:off x="11350884" y="6345334"/>
-            <a:ext cx="1232054" cy="600610"/>
-          </a:xfrm>
-          <a:prstGeom prst="triangle">
-            <a:avLst/>
-          </a:prstGeom>
-          <a:solidFill>
-            <a:srgbClr val="5046D6"/>
-          </a:solidFill>
-        </p:spPr>
-        <p:style>
-          <a:lnRef idx="2">
-            <a:schemeClr val="accent1">
-              <a:shade val="50000"/>
-            </a:schemeClr>
-          </a:lnRef>
-          <a:fillRef idx="1">
-            <a:schemeClr val="accent1"/>
-          </a:fillRef>
-          <a:effectRef idx="0">
-            <a:schemeClr val="accent1"/>
-          </a:effectRef>
-          <a:fontRef idx="minor">
-            <a:schemeClr val="lt1"/>
-          </a:fontRef>
-        </p:style>
-        <p:txBody>
-          <a:bodyPr rtlCol="0" anchor="ctr"/>
-          <a:lstStyle/>
-          <a:p>
-            <a:pPr algn="ctr"/>
-            <a:endParaRPr lang="en-IN"/>
-          </a:p>
-        </p:txBody>
-      </p:sp>
-      <p:sp>
-        <p:nvSpPr>
-          <p:cNvPr id="6" name="Rectangle 5">
-            <a:extLst>
-              <a:ext uri="{FF2B5EF4-FFF2-40B4-BE49-F238E27FC236}">
-                <a16:creationId xmlns:a16="http://schemas.microsoft.com/office/drawing/2014/main" id="{B87B1F75-0489-E5FB-2EA5-9674711512FF}"/>
-              </a:ext>
-            </a:extLst>
-          </p:cNvPr>
-          <p:cNvSpPr/>
-          <p:nvPr/>
-        </p:nvSpPr>
-        <p:spPr>
-          <a:xfrm>
-            <a:off x="389107" y="147843"/>
-            <a:ext cx="1608133" cy="369332"/>
-          </a:xfrm>
-          <a:prstGeom prst="rect">
-            <a:avLst/>
-          </a:prstGeom>
-        </p:spPr>
-        <p:txBody>
-          <a:bodyPr wrap="none">
-            <a:spAutoFit/>
-          </a:bodyPr>
-          <a:lstStyle/>
-          <a:p>
-            <a:r>
-              <a:rPr lang="en-US" dirty="0">
-                <a:solidFill>
-                  <a:srgbClr val="0070C0"/>
-                </a:solidFill>
-                <a:latin typeface="Arial Black"/>
-                <a:ea typeface="+mn-lt"/>
-                <a:cs typeface="+mn-lt"/>
-              </a:rPr>
-              <a:t>CONTENTS</a:t>
-            </a:r>
-            <a:endParaRPr lang="en-IN" dirty="0">
-              <a:solidFill>
-                <a:srgbClr val="0070C0"/>
-              </a:solidFill>
-              <a:latin typeface="Arial Black"/>
-              <a:ea typeface="+mn-lt"/>
-              <a:cs typeface="+mn-lt"/>
-            </a:endParaRPr>
-          </a:p>
-        </p:txBody>
-      </p:sp>
-      <p:sp>
-        <p:nvSpPr>
-          <p:cNvPr id="8" name="Rectangle 7">
-            <a:extLst>
-              <a:ext uri="{FF2B5EF4-FFF2-40B4-BE49-F238E27FC236}">
-                <a16:creationId xmlns:a16="http://schemas.microsoft.com/office/drawing/2014/main" id="{9AF4A4A9-290A-8A78-9835-C0134F1B9FA8}"/>
-              </a:ext>
-            </a:extLst>
-          </p:cNvPr>
-          <p:cNvSpPr/>
-          <p:nvPr/>
-        </p:nvSpPr>
-        <p:spPr>
-          <a:xfrm>
-            <a:off x="6751985" y="147843"/>
-            <a:ext cx="3774175" cy="369332"/>
-          </a:xfrm>
-          <a:prstGeom prst="rect">
-            <a:avLst/>
-          </a:prstGeom>
-        </p:spPr>
-        <p:txBody>
-          <a:bodyPr wrap="none">
-            <a:spAutoFit/>
-          </a:bodyPr>
-          <a:lstStyle/>
-          <a:p>
-            <a:r>
-              <a:rPr lang="en-IN" dirty="0">
-                <a:latin typeface="Arial Black" panose="020B0A04020102020204" pitchFamily="34" charset="0"/>
-              </a:rPr>
-              <a:t>Unlimited Powerful Learning</a:t>
-            </a:r>
-          </a:p>
-        </p:txBody>
-      </p:sp>
-      <p:sp>
-        <p:nvSpPr>
-          <p:cNvPr id="10" name="TextBox 9">
-            <a:extLst>
-              <a:ext uri="{FF2B5EF4-FFF2-40B4-BE49-F238E27FC236}">
-                <a16:creationId xmlns:a16="http://schemas.microsoft.com/office/drawing/2014/main" id="{B9FB9FAD-B7F4-112F-DD3F-193367E2BF56}"/>
-              </a:ext>
-            </a:extLst>
-          </p:cNvPr>
-          <p:cNvSpPr txBox="1"/>
-          <p:nvPr/>
-        </p:nvSpPr>
-        <p:spPr>
-          <a:xfrm>
-            <a:off x="686857" y="1013243"/>
-            <a:ext cx="10633183" cy="3830279"/>
-          </a:xfrm>
-          <a:prstGeom prst="rect">
-            <a:avLst/>
-          </a:prstGeom>
-          <a:noFill/>
-        </p:spPr>
-        <p:txBody>
-          <a:bodyPr wrap="square">
-            <a:spAutoFit/>
-          </a:bodyPr>
-          <a:lstStyle/>
-          <a:p>
-            <a:pPr>
-              <a:lnSpc>
-                <a:spcPct val="150000"/>
-              </a:lnSpc>
-            </a:pPr>
-            <a:r>
-              <a:rPr lang="en-IN" sz="2400" b="1" dirty="0"/>
-              <a:t>Technology Stack:</a:t>
-            </a:r>
-            <a:r>
-              <a:rPr lang="en-US" sz="2000" dirty="0"/>
-              <a:t>	</a:t>
-            </a:r>
-          </a:p>
-          <a:p>
-            <a:pPr>
-              <a:lnSpc>
-                <a:spcPct val="150000"/>
-              </a:lnSpc>
-              <a:buFont typeface="Arial" panose="020B0604020202020204" pitchFamily="34" charset="0"/>
-              <a:buChar char="•"/>
-            </a:pPr>
-            <a:r>
-              <a:rPr lang="en-US" sz="2000" dirty="0"/>
-              <a:t>Frontend	</a:t>
-            </a:r>
-            <a:r>
-              <a:rPr lang="en-US" sz="2000"/>
-              <a:t>Angular 19</a:t>
-            </a:r>
-            <a:endParaRPr lang="en-US" sz="2000" dirty="0"/>
-          </a:p>
-          <a:p>
-            <a:pPr>
-              <a:lnSpc>
-                <a:spcPct val="150000"/>
-              </a:lnSpc>
-              <a:buFont typeface="Arial" panose="020B0604020202020204" pitchFamily="34" charset="0"/>
-              <a:buChar char="•"/>
-            </a:pPr>
-            <a:r>
-              <a:rPr lang="en-US" sz="2000" dirty="0"/>
-              <a:t>Backend	Spring Boot (Java 21)</a:t>
-            </a:r>
-          </a:p>
-          <a:p>
-            <a:pPr>
-              <a:lnSpc>
-                <a:spcPct val="150000"/>
-              </a:lnSpc>
-              <a:buFont typeface="Arial" panose="020B0604020202020204" pitchFamily="34" charset="0"/>
-              <a:buChar char="•"/>
-            </a:pPr>
-            <a:r>
-              <a:rPr lang="en-US" sz="2000" dirty="0"/>
-              <a:t>Database	MySQL</a:t>
-            </a:r>
-          </a:p>
-          <a:p>
-            <a:pPr>
-              <a:lnSpc>
-                <a:spcPct val="150000"/>
-              </a:lnSpc>
-              <a:buFont typeface="Arial" panose="020B0604020202020204" pitchFamily="34" charset="0"/>
-              <a:buChar char="•"/>
-            </a:pPr>
-            <a:r>
-              <a:rPr lang="en-US" sz="2000" dirty="0"/>
-              <a:t>Security	Spring Security, JWT</a:t>
-            </a:r>
-          </a:p>
-          <a:p>
-            <a:pPr>
-              <a:lnSpc>
-                <a:spcPct val="150000"/>
-              </a:lnSpc>
-              <a:buFont typeface="Arial" panose="020B0604020202020204" pitchFamily="34" charset="0"/>
-              <a:buChar char="•"/>
-            </a:pPr>
-            <a:r>
-              <a:rPr lang="en-US" sz="2000" dirty="0"/>
-              <a:t>Monitoring	Spring Boot Actuator, Prometheus, Grafana</a:t>
-            </a:r>
-          </a:p>
-          <a:p>
-            <a:pPr>
-              <a:lnSpc>
-                <a:spcPct val="150000"/>
-              </a:lnSpc>
-              <a:buFont typeface="Arial" panose="020B0604020202020204" pitchFamily="34" charset="0"/>
-              <a:buChar char="•"/>
-            </a:pPr>
-            <a:r>
-              <a:rPr lang="en-US" sz="2000" dirty="0"/>
-              <a:t>Dev Tools	Postman, Visual Studio Code, STS, Maven</a:t>
-            </a:r>
-          </a:p>
-          <a:p>
-            <a:pPr>
-              <a:lnSpc>
-                <a:spcPct val="150000"/>
-              </a:lnSpc>
-              <a:buFont typeface="Arial" panose="020B0604020202020204" pitchFamily="34" charset="0"/>
-              <a:buChar char="•"/>
-            </a:pPr>
-            <a:r>
-              <a:rPr lang="en-US" sz="2000" dirty="0"/>
-              <a:t>Others	                YouTube Embedding, Role-based Access Control</a:t>
-            </a:r>
-          </a:p>
-        </p:txBody>
-      </p:sp>
-    </p:spTree>
-    <p:extLst>
-      <p:ext uri="{BB962C8B-B14F-4D97-AF65-F5344CB8AC3E}">
-        <p14:creationId xmlns:p14="http://schemas.microsoft.com/office/powerpoint/2010/main" val="2074195798"/>
       </p:ext>
     </p:extLst>
   </p:cSld>
@@ -10623,4 +11569,47 @@
     </a:folHlink>
   </a:clrScheme>
 </a:themeOverride>
+</file>
+
+<file path=ppt/theme/themeOverride4.xml><?xml version="1.0" encoding="utf-8"?>
+<a:themeOverride xmlns:a="http://schemas.openxmlformats.org/drawingml/2006/main">
+  <a:clrScheme name="Office">
+    <a:dk1>
+      <a:sysClr val="windowText" lastClr="000000"/>
+    </a:dk1>
+    <a:lt1>
+      <a:sysClr val="window" lastClr="FFFFFF"/>
+    </a:lt1>
+    <a:dk2>
+      <a:srgbClr val="44546A"/>
+    </a:dk2>
+    <a:lt2>
+      <a:srgbClr val="E7E6E6"/>
+    </a:lt2>
+    <a:accent1>
+      <a:srgbClr val="4472C4"/>
+    </a:accent1>
+    <a:accent2>
+      <a:srgbClr val="ED7D31"/>
+    </a:accent2>
+    <a:accent3>
+      <a:srgbClr val="A5A5A5"/>
+    </a:accent3>
+    <a:accent4>
+      <a:srgbClr val="FFC000"/>
+    </a:accent4>
+    <a:accent5>
+      <a:srgbClr val="5B9BD5"/>
+    </a:accent5>
+    <a:accent6>
+      <a:srgbClr val="70AD47"/>
+    </a:accent6>
+    <a:hlink>
+      <a:srgbClr val="0563C1"/>
+    </a:hlink>
+    <a:folHlink>
+      <a:srgbClr val="954F72"/>
+    </a:folHlink>
+  </a:clrScheme>
+</a:themeOverride>
 </file>
</xml_diff>

<commit_message>
adding mysql data dump and few changes in project files
</commit_message>
<xml_diff>
--- a/UPL_TUTORIAL.pptx
+++ b/UPL_TUTORIAL.pptx
@@ -7157,7 +7157,7 @@
         <p:spPr>
           <a:xfrm>
             <a:off x="1638202" y="1831853"/>
-            <a:ext cx="10712408" cy="3477875"/>
+            <a:ext cx="10712408" cy="4401205"/>
           </a:xfrm>
           <a:prstGeom prst="rect">
             <a:avLst/>
@@ -7241,7 +7241,21 @@
               <a:rPr lang="en-GB" sz="2000" dirty="0"/>
               <a:t>Date: 24/05/2025</a:t>
             </a:r>
-            <a:endParaRPr lang="en-US" sz="2000" dirty="0"/>
+          </a:p>
+          <a:p>
+            <a:endParaRPr lang="en-GB" sz="2000" dirty="0"/>
+          </a:p>
+          <a:p>
+            <a:r>
+              <a:rPr lang="en-GB" sz="2000" b="1" dirty="0"/>
+              <a:t>GitHub Link:</a:t>
+            </a:r>
+          </a:p>
+          <a:p>
+            <a:r>
+              <a:rPr lang="en-US" sz="2000" dirty="0"/>
+              <a:t>https://github.com/MaryPriyanga/springboot-angular-tutorial-app.git</a:t>
+            </a:r>
           </a:p>
         </p:txBody>
       </p:sp>

</xml_diff>

<commit_message>
added new features after review
</commit_message>
<xml_diff>
--- a/UPL_TUTORIAL.pptx
+++ b/UPL_TUTORIAL.pptx
@@ -276,7 +276,7 @@
           <a:p>
             <a:fld id="{32AD6B31-71B2-4178-AC7E-A76CB429D216}" type="datetimeFigureOut">
               <a:rPr lang="en-IN" smtClean="0"/>
-              <a:t>28-05-2025</a:t>
+              <a:t>30-05-2025</a:t>
             </a:fld>
             <a:endParaRPr lang="en-IN"/>
           </a:p>
@@ -476,7 +476,7 @@
           <a:p>
             <a:fld id="{32AD6B31-71B2-4178-AC7E-A76CB429D216}" type="datetimeFigureOut">
               <a:rPr lang="en-IN" smtClean="0"/>
-              <a:t>28-05-2025</a:t>
+              <a:t>30-05-2025</a:t>
             </a:fld>
             <a:endParaRPr lang="en-IN"/>
           </a:p>
@@ -686,7 +686,7 @@
           <a:p>
             <a:fld id="{32AD6B31-71B2-4178-AC7E-A76CB429D216}" type="datetimeFigureOut">
               <a:rPr lang="en-IN" smtClean="0"/>
-              <a:t>28-05-2025</a:t>
+              <a:t>30-05-2025</a:t>
             </a:fld>
             <a:endParaRPr lang="en-IN"/>
           </a:p>
@@ -886,7 +886,7 @@
           <a:p>
             <a:fld id="{32AD6B31-71B2-4178-AC7E-A76CB429D216}" type="datetimeFigureOut">
               <a:rPr lang="en-IN" smtClean="0"/>
-              <a:t>28-05-2025</a:t>
+              <a:t>30-05-2025</a:t>
             </a:fld>
             <a:endParaRPr lang="en-IN"/>
           </a:p>
@@ -1162,7 +1162,7 @@
           <a:p>
             <a:fld id="{32AD6B31-71B2-4178-AC7E-A76CB429D216}" type="datetimeFigureOut">
               <a:rPr lang="en-IN" smtClean="0"/>
-              <a:t>28-05-2025</a:t>
+              <a:t>30-05-2025</a:t>
             </a:fld>
             <a:endParaRPr lang="en-IN"/>
           </a:p>
@@ -1430,7 +1430,7 @@
           <a:p>
             <a:fld id="{32AD6B31-71B2-4178-AC7E-A76CB429D216}" type="datetimeFigureOut">
               <a:rPr lang="en-IN" smtClean="0"/>
-              <a:t>28-05-2025</a:t>
+              <a:t>30-05-2025</a:t>
             </a:fld>
             <a:endParaRPr lang="en-IN"/>
           </a:p>
@@ -1845,7 +1845,7 @@
           <a:p>
             <a:fld id="{32AD6B31-71B2-4178-AC7E-A76CB429D216}" type="datetimeFigureOut">
               <a:rPr lang="en-IN" smtClean="0"/>
-              <a:t>28-05-2025</a:t>
+              <a:t>30-05-2025</a:t>
             </a:fld>
             <a:endParaRPr lang="en-IN"/>
           </a:p>
@@ -1987,7 +1987,7 @@
           <a:p>
             <a:fld id="{32AD6B31-71B2-4178-AC7E-A76CB429D216}" type="datetimeFigureOut">
               <a:rPr lang="en-IN" smtClean="0"/>
-              <a:t>28-05-2025</a:t>
+              <a:t>30-05-2025</a:t>
             </a:fld>
             <a:endParaRPr lang="en-IN"/>
           </a:p>
@@ -2100,7 +2100,7 @@
           <a:p>
             <a:fld id="{32AD6B31-71B2-4178-AC7E-A76CB429D216}" type="datetimeFigureOut">
               <a:rPr lang="en-IN" smtClean="0"/>
-              <a:t>28-05-2025</a:t>
+              <a:t>30-05-2025</a:t>
             </a:fld>
             <a:endParaRPr lang="en-IN"/>
           </a:p>
@@ -2413,7 +2413,7 @@
           <a:p>
             <a:fld id="{32AD6B31-71B2-4178-AC7E-A76CB429D216}" type="datetimeFigureOut">
               <a:rPr lang="en-IN" smtClean="0"/>
-              <a:t>28-05-2025</a:t>
+              <a:t>30-05-2025</a:t>
             </a:fld>
             <a:endParaRPr lang="en-IN"/>
           </a:p>
@@ -2702,7 +2702,7 @@
           <a:p>
             <a:fld id="{32AD6B31-71B2-4178-AC7E-A76CB429D216}" type="datetimeFigureOut">
               <a:rPr lang="en-IN" smtClean="0"/>
-              <a:t>28-05-2025</a:t>
+              <a:t>30-05-2025</a:t>
             </a:fld>
             <a:endParaRPr lang="en-IN"/>
           </a:p>
@@ -2945,7 +2945,7 @@
           <a:p>
             <a:fld id="{32AD6B31-71B2-4178-AC7E-A76CB429D216}" type="datetimeFigureOut">
               <a:rPr lang="en-IN" smtClean="0"/>
-              <a:t>28-05-2025</a:t>
+              <a:t>30-05-2025</a:t>
             </a:fld>
             <a:endParaRPr lang="en-IN"/>
           </a:p>
@@ -7156,7 +7156,7 @@
         </p:nvSpPr>
         <p:spPr>
           <a:xfrm>
-            <a:off x="1638202" y="1831853"/>
+            <a:off x="1479592" y="1814719"/>
             <a:ext cx="10712408" cy="4401205"/>
           </a:xfrm>
           <a:prstGeom prst="rect">
@@ -9658,7 +9658,7 @@
         <p:spPr>
           <a:xfrm>
             <a:off x="686857" y="1013243"/>
-            <a:ext cx="10960198" cy="5632311"/>
+            <a:ext cx="10960198" cy="4247317"/>
           </a:xfrm>
           <a:prstGeom prst="rect">
             <a:avLst/>
@@ -9749,52 +9749,23 @@
             <a:pPr>
               <a:buNone/>
             </a:pPr>
-            <a:endParaRPr lang="en-GB" dirty="0"/>
+            <a:endParaRPr lang="en-GB" b="1" dirty="0"/>
           </a:p>
           <a:p>
             <a:pPr>
               <a:buNone/>
             </a:pPr>
             <a:r>
+              <a:rPr lang="en-GB" b="1"/>
+              <a:t>Feature </a:t>
+            </a:r>
+            <a:r>
               <a:rPr lang="en-GB" b="1" dirty="0"/>
-              <a:t>Feature 7: Deployment</a:t>
-            </a:r>
-            <a:endParaRPr lang="en-GB" dirty="0"/>
-          </a:p>
-          <a:p>
-            <a:pPr>
-              <a:buFont typeface="Arial" panose="020B0604020202020204" pitchFamily="34" charset="0"/>
-              <a:buChar char="•"/>
-            </a:pPr>
-            <a:r>
-              <a:rPr lang="en-GB" dirty="0"/>
-              <a:t>Description: Full-stack application components (Angular, Spring Boot, MySQL, Redis, Grafana, Prometheus) containerized using Docker and orchestrated via Docker Compose.</a:t>
-            </a:r>
-          </a:p>
-          <a:p>
-            <a:pPr>
-              <a:buFont typeface="Arial" panose="020B0604020202020204" pitchFamily="34" charset="0"/>
-              <a:buChar char="•"/>
-            </a:pPr>
-            <a:r>
-              <a:rPr lang="en-GB" dirty="0"/>
-              <a:t>Benefits: Simplified setup and consistent environment across development and deployment stages.</a:t>
-            </a:r>
-          </a:p>
-          <a:p>
-            <a:pPr>
-              <a:buFont typeface="Arial" panose="020B0604020202020204" pitchFamily="34" charset="0"/>
-              <a:buChar char="•"/>
-            </a:pPr>
-            <a:endParaRPr lang="en-GB" dirty="0"/>
-          </a:p>
-          <a:p>
-            <a:pPr>
-              <a:buNone/>
-            </a:pPr>
-            <a:r>
-              <a:rPr lang="en-GB" b="1" dirty="0"/>
-              <a:t>Feature 8: </a:t>
+              <a:t>7</a:t>
+            </a:r>
+            <a:r>
+              <a:rPr lang="en-GB" b="1"/>
+              <a:t>: </a:t>
             </a:r>
             <a:r>
               <a:rPr lang="en-IN" b="1" dirty="0"/>

</xml_diff>